<commit_message>
initial docs on new stuff (client-server, authorapp, etc.)
</commit_message>
<xml_diff>
--- a/docs/drools-app-design-notes.pptx
+++ b/docs/drools-app-design-notes.pptx
@@ -5,8 +5,8 @@
     <p:sldMasterId id="2147483648" r:id="rId1"/>
   </p:sldMasterIdLst>
   <p:sldIdLst>
-    <p:sldId id="256" r:id="rId2"/>
-    <p:sldId id="257" r:id="rId3"/>
+    <p:sldId id="259" r:id="rId2"/>
+    <p:sldId id="256" r:id="rId3"/>
     <p:sldId id="258" r:id="rId4"/>
   </p:sldIdLst>
   <p:sldSz cx="9144000" cy="6858000" type="screen4x3"/>
@@ -291,7 +291,7 @@
             <a:fld id="{1D8BD707-D9CF-40AE-B4C6-C98DA3205C09}" type="datetimeFigureOut">
               <a:rPr lang="en-US" smtClean="0"/>
               <a:pPr/>
-              <a:t>5/12/2010</a:t>
+              <a:t>6/21/2010</a:t>
             </a:fld>
             <a:endParaRPr lang="en-US"/>
           </a:p>
@@ -458,7 +458,7 @@
             <a:fld id="{1D8BD707-D9CF-40AE-B4C6-C98DA3205C09}" type="datetimeFigureOut">
               <a:rPr lang="en-US" smtClean="0"/>
               <a:pPr/>
-              <a:t>5/12/2010</a:t>
+              <a:t>6/21/2010</a:t>
             </a:fld>
             <a:endParaRPr lang="en-US"/>
           </a:p>
@@ -635,7 +635,7 @@
             <a:fld id="{1D8BD707-D9CF-40AE-B4C6-C98DA3205C09}" type="datetimeFigureOut">
               <a:rPr lang="en-US" smtClean="0"/>
               <a:pPr/>
-              <a:t>5/12/2010</a:t>
+              <a:t>6/21/2010</a:t>
             </a:fld>
             <a:endParaRPr lang="en-US"/>
           </a:p>
@@ -802,7 +802,7 @@
             <a:fld id="{1D8BD707-D9CF-40AE-B4C6-C98DA3205C09}" type="datetimeFigureOut">
               <a:rPr lang="en-US" smtClean="0"/>
               <a:pPr/>
-              <a:t>5/12/2010</a:t>
+              <a:t>6/21/2010</a:t>
             </a:fld>
             <a:endParaRPr lang="en-US"/>
           </a:p>
@@ -1045,7 +1045,7 @@
             <a:fld id="{1D8BD707-D9CF-40AE-B4C6-C98DA3205C09}" type="datetimeFigureOut">
               <a:rPr lang="en-US" smtClean="0"/>
               <a:pPr/>
-              <a:t>5/12/2010</a:t>
+              <a:t>6/21/2010</a:t>
             </a:fld>
             <a:endParaRPr lang="en-US"/>
           </a:p>
@@ -1330,7 +1330,7 @@
             <a:fld id="{1D8BD707-D9CF-40AE-B4C6-C98DA3205C09}" type="datetimeFigureOut">
               <a:rPr lang="en-US" smtClean="0"/>
               <a:pPr/>
-              <a:t>5/12/2010</a:t>
+              <a:t>6/21/2010</a:t>
             </a:fld>
             <a:endParaRPr lang="en-US"/>
           </a:p>
@@ -1749,7 +1749,7 @@
             <a:fld id="{1D8BD707-D9CF-40AE-B4C6-C98DA3205C09}" type="datetimeFigureOut">
               <a:rPr lang="en-US" smtClean="0"/>
               <a:pPr/>
-              <a:t>5/12/2010</a:t>
+              <a:t>6/21/2010</a:t>
             </a:fld>
             <a:endParaRPr lang="en-US"/>
           </a:p>
@@ -1864,7 +1864,7 @@
             <a:fld id="{1D8BD707-D9CF-40AE-B4C6-C98DA3205C09}" type="datetimeFigureOut">
               <a:rPr lang="en-US" smtClean="0"/>
               <a:pPr/>
-              <a:t>5/12/2010</a:t>
+              <a:t>6/21/2010</a:t>
             </a:fld>
             <a:endParaRPr lang="en-US"/>
           </a:p>
@@ -1956,7 +1956,7 @@
             <a:fld id="{1D8BD707-D9CF-40AE-B4C6-C98DA3205C09}" type="datetimeFigureOut">
               <a:rPr lang="en-US" smtClean="0"/>
               <a:pPr/>
-              <a:t>5/12/2010</a:t>
+              <a:t>6/21/2010</a:t>
             </a:fld>
             <a:endParaRPr lang="en-US"/>
           </a:p>
@@ -2230,7 +2230,7 @@
             <a:fld id="{1D8BD707-D9CF-40AE-B4C6-C98DA3205C09}" type="datetimeFigureOut">
               <a:rPr lang="en-US" smtClean="0"/>
               <a:pPr/>
-              <a:t>5/12/2010</a:t>
+              <a:t>6/21/2010</a:t>
             </a:fld>
             <a:endParaRPr lang="en-US"/>
           </a:p>
@@ -2480,7 +2480,7 @@
             <a:fld id="{1D8BD707-D9CF-40AE-B4C6-C98DA3205C09}" type="datetimeFigureOut">
               <a:rPr lang="en-US" smtClean="0"/>
               <a:pPr/>
-              <a:t>5/12/2010</a:t>
+              <a:t>6/21/2010</a:t>
             </a:fld>
             <a:endParaRPr lang="en-US"/>
           </a:p>
@@ -2690,7 +2690,7 @@
             <a:fld id="{1D8BD707-D9CF-40AE-B4C6-C98DA3205C09}" type="datetimeFigureOut">
               <a:rPr lang="en-US" smtClean="0"/>
               <a:pPr/>
-              <a:t>5/12/2010</a:t>
+              <a:t>6/21/2010</a:t>
             </a:fld>
             <a:endParaRPr lang="en-US"/>
           </a:p>
@@ -3078,7 +3078,7 @@
           <a:p>
             <a:r>
               <a:rPr lang="en-GB" dirty="0" smtClean="0"/>
-              <a:t>overview</a:t>
+              <a:t>Client/server interaction overview</a:t>
             </a:r>
             <a:endParaRPr lang="en-GB" dirty="0"/>
           </a:p>
@@ -3086,16 +3086,16 @@
       </p:sp>
       <p:sp>
         <p:nvSpPr>
-          <p:cNvPr id="5" name="Flowchart: Magnetic Disk 4"/>
+          <p:cNvPr id="5" name="Rounded Rectangle 4"/>
           <p:cNvSpPr/>
           <p:nvPr/>
         </p:nvSpPr>
         <p:spPr>
           <a:xfrm>
-            <a:off x="3657600" y="5029200"/>
-            <a:ext cx="990600" cy="1066800"/>
-          </a:xfrm>
-          <a:prstGeom prst="flowChartMagneticDisk">
+            <a:off x="4648200" y="3505200"/>
+            <a:ext cx="1219200" cy="1066800"/>
+          </a:xfrm>
+          <a:prstGeom prst="roundRect">
             <a:avLst/>
           </a:prstGeom>
         </p:spPr>
@@ -3122,7 +3122,14 @@
             <a:pPr algn="ctr"/>
             <a:r>
               <a:rPr lang="en-GB" dirty="0" smtClean="0"/>
-              <a:t>Session DB</a:t>
+              <a:t>Lobby server</a:t>
+            </a:r>
+          </a:p>
+          <a:p>
+            <a:pPr algn="ctr"/>
+            <a:r>
+              <a:rPr lang="en-GB" dirty="0" smtClean="0"/>
+              <a:t>(1..n)</a:t>
             </a:r>
             <a:endParaRPr lang="en-GB" dirty="0"/>
           </a:p>
@@ -3130,16 +3137,16 @@
       </p:sp>
       <p:sp>
         <p:nvSpPr>
-          <p:cNvPr id="6" name="Rounded Rectangle 5"/>
+          <p:cNvPr id="6" name="Flowchart: Document 5"/>
           <p:cNvSpPr/>
           <p:nvPr/>
         </p:nvSpPr>
         <p:spPr>
           <a:xfrm>
-            <a:off x="3581400" y="4114800"/>
-            <a:ext cx="1066800" cy="609600"/>
-          </a:xfrm>
-          <a:prstGeom prst="roundRect">
+            <a:off x="4114800" y="2667000"/>
+            <a:ext cx="990600" cy="762000"/>
+          </a:xfrm>
+          <a:prstGeom prst="flowChartDocument">
             <a:avLst/>
           </a:prstGeom>
         </p:spPr>
@@ -3166,59 +3173,32 @@
             <a:pPr algn="ctr"/>
             <a:r>
               <a:rPr lang="en-GB" dirty="0" smtClean="0"/>
-              <a:t>JPA provider</a:t>
+              <a:t>Lobby def. file</a:t>
             </a:r>
             <a:endParaRPr lang="en-GB" dirty="0"/>
           </a:p>
         </p:txBody>
       </p:sp>
-      <p:cxnSp>
-        <p:nvCxnSpPr>
-          <p:cNvPr id="8" name="Straight Connector 7"/>
-          <p:cNvCxnSpPr>
-            <a:stCxn id="6" idx="2"/>
-            <a:endCxn id="5" idx="1"/>
-          </p:cNvCxnSpPr>
-          <p:nvPr/>
-        </p:nvCxnSpPr>
-        <p:spPr>
-          <a:xfrm rot="16200000" flipH="1">
-            <a:off x="3981450" y="4857750"/>
-            <a:ext cx="304800" cy="38100"/>
-          </a:xfrm>
-          <a:prstGeom prst="line">
-            <a:avLst/>
-          </a:prstGeom>
-        </p:spPr>
-        <p:style>
-          <a:lnRef idx="1">
-            <a:schemeClr val="accent1"/>
-          </a:lnRef>
-          <a:fillRef idx="0">
-            <a:schemeClr val="accent1"/>
-          </a:fillRef>
-          <a:effectRef idx="0">
-            <a:schemeClr val="accent1"/>
-          </a:effectRef>
-          <a:fontRef idx="minor">
-            <a:schemeClr val="tx1"/>
-          </a:fontRef>
-        </p:style>
-      </p:cxnSp>
-      <p:sp>
-        <p:nvSpPr>
-          <p:cNvPr id="9" name="Rectangle 8"/>
+      <p:sp>
+        <p:nvSpPr>
+          <p:cNvPr id="7" name="Rounded Rectangle 6"/>
           <p:cNvSpPr/>
           <p:nvPr/>
         </p:nvSpPr>
         <p:spPr>
           <a:xfrm>
-            <a:off x="5105400" y="2743200"/>
-            <a:ext cx="1524000" cy="914400"/>
-          </a:xfrm>
-          <a:prstGeom prst="rect">
+            <a:off x="6477000" y="3505200"/>
+            <a:ext cx="2438400" cy="2286000"/>
+          </a:xfrm>
+          <a:prstGeom prst="roundRect">
             <a:avLst/>
           </a:prstGeom>
+          <a:solidFill>
+            <a:schemeClr val="accent1">
+              <a:lumMod val="60000"/>
+              <a:lumOff val="40000"/>
+            </a:schemeClr>
+          </a:solidFill>
         </p:spPr>
         <p:style>
           <a:lnRef idx="2">
@@ -3241,31 +3221,24 @@
           <a:lstStyle/>
           <a:p>
             <a:pPr algn="ctr"/>
-            <a:r>
-              <a:rPr lang="en-GB" dirty="0" smtClean="0"/>
-              <a:t>Drools fusion rule/event engine</a:t>
-            </a:r>
             <a:endParaRPr lang="en-GB" dirty="0"/>
           </a:p>
         </p:txBody>
       </p:sp>
       <p:sp>
         <p:nvSpPr>
-          <p:cNvPr id="10" name="Pentagon 9"/>
+          <p:cNvPr id="8" name="Oval 7"/>
           <p:cNvSpPr/>
           <p:nvPr/>
         </p:nvSpPr>
         <p:spPr>
           <a:xfrm>
-            <a:off x="3505200" y="2743200"/>
-            <a:ext cx="1143000" cy="609600"/>
-          </a:xfrm>
-          <a:prstGeom prst="homePlate">
+            <a:off x="7239000" y="4267200"/>
+            <a:ext cx="1524000" cy="1295400"/>
+          </a:xfrm>
+          <a:prstGeom prst="ellipse">
             <a:avLst/>
           </a:prstGeom>
-          <a:solidFill>
-            <a:schemeClr val="bg1"/>
-          </a:solidFill>
         </p:spPr>
         <p:style>
           <a:lnRef idx="2">
@@ -3290,7 +3263,25 @@
             <a:pPr algn="ctr"/>
             <a:r>
               <a:rPr lang="en-GB" dirty="0" smtClean="0"/>
-              <a:t>Session (game)</a:t>
+              <a:t>“Session” </a:t>
+            </a:r>
+            <a:br>
+              <a:rPr lang="en-GB" dirty="0" smtClean="0"/>
+            </a:br>
+            <a:r>
+              <a:rPr lang="en-GB" dirty="0" smtClean="0"/>
+              <a:t>= game </a:t>
+            </a:r>
+            <a:r>
+              <a:rPr lang="en-GB" dirty="0" smtClean="0"/>
+              <a:t>instance</a:t>
+            </a:r>
+          </a:p>
+          <a:p>
+            <a:pPr algn="ctr"/>
+            <a:r>
+              <a:rPr lang="en-GB" dirty="0" smtClean="0"/>
+              <a:t>(1..n)</a:t>
             </a:r>
             <a:endParaRPr lang="en-GB" dirty="0"/>
           </a:p>
@@ -3298,14 +3289,14 @@
       </p:sp>
       <p:sp>
         <p:nvSpPr>
-          <p:cNvPr id="11" name="Flowchart: Document 10"/>
+          <p:cNvPr id="14" name="Flowchart: Document 13"/>
           <p:cNvSpPr/>
           <p:nvPr/>
         </p:nvSpPr>
         <p:spPr>
           <a:xfrm>
-            <a:off x="5562600" y="4114800"/>
-            <a:ext cx="838200" cy="685800"/>
+            <a:off x="2362200" y="1981200"/>
+            <a:ext cx="990600" cy="990600"/>
           </a:xfrm>
           <a:prstGeom prst="flowChartDocument">
             <a:avLst/>
@@ -3334,7 +3325,7 @@
             <a:pPr algn="ctr"/>
             <a:r>
               <a:rPr lang="en-GB" dirty="0" smtClean="0"/>
-              <a:t>rules</a:t>
+              <a:t>RSS Lobby list file</a:t>
             </a:r>
             <a:endParaRPr lang="en-GB" dirty="0"/>
           </a:p>
@@ -3342,17 +3333,16 @@
       </p:sp>
       <p:cxnSp>
         <p:nvCxnSpPr>
-          <p:cNvPr id="13" name="Straight Arrow Connector 12"/>
+          <p:cNvPr id="16" name="Straight Arrow Connector 15"/>
           <p:cNvCxnSpPr>
-            <a:stCxn id="11" idx="0"/>
-            <a:endCxn id="9" idx="2"/>
+            <a:stCxn id="5" idx="3"/>
           </p:cNvCxnSpPr>
           <p:nvPr/>
         </p:nvCxnSpPr>
         <p:spPr>
-          <a:xfrm rot="16200000" flipV="1">
-            <a:off x="5695950" y="3829050"/>
-            <a:ext cx="457200" cy="114300"/>
+          <a:xfrm>
+            <a:off x="5867400" y="4038600"/>
+            <a:ext cx="609600" cy="1588"/>
           </a:xfrm>
           <a:prstGeom prst="straightConnector1">
             <a:avLst/>
@@ -3378,21 +3368,25 @@
       </p:cxnSp>
       <p:sp>
         <p:nvSpPr>
-          <p:cNvPr id="14" name="Pentagon 13"/>
+          <p:cNvPr id="18" name="Rectangular Callout 17"/>
           <p:cNvSpPr/>
           <p:nvPr/>
         </p:nvSpPr>
         <p:spPr>
           <a:xfrm>
-            <a:off x="3581400" y="2819400"/>
-            <a:ext cx="1143000" cy="609600"/>
-          </a:xfrm>
-          <a:prstGeom prst="homePlate">
-            <a:avLst/>
-          </a:prstGeom>
-          <a:solidFill>
-            <a:schemeClr val="bg1"/>
-          </a:solidFill>
+            <a:off x="5715000" y="2286000"/>
+            <a:ext cx="1447800" cy="762000"/>
+          </a:xfrm>
+          <a:prstGeom prst="wedgeRectCallout">
+            <a:avLst>
+              <a:gd name="adj1" fmla="val -19459"/>
+              <a:gd name="adj2" fmla="val 176185"/>
+            </a:avLst>
+          </a:prstGeom>
+          <a:noFill/>
+          <a:ln>
+            <a:prstDash val="sysDash"/>
+          </a:ln>
         </p:spPr>
         <p:style>
           <a:lnRef idx="2">
@@ -3416,25 +3410,33 @@
           <a:p>
             <a:pPr algn="ctr"/>
             <a:r>
-              <a:rPr lang="en-GB" dirty="0" smtClean="0"/>
-              <a:t>Session (game)</a:t>
-            </a:r>
-            <a:endParaRPr lang="en-GB" dirty="0"/>
-          </a:p>
-        </p:txBody>
-      </p:sp>
-      <p:sp>
-        <p:nvSpPr>
-          <p:cNvPr id="15" name="Pentagon 14"/>
+              <a:rPr lang="en-GB" dirty="0" smtClean="0">
+                <a:solidFill>
+                  <a:schemeClr val="tx1"/>
+                </a:solidFill>
+              </a:rPr>
+              <a:t>3b:Registers client</a:t>
+            </a:r>
+            <a:endParaRPr lang="en-GB" dirty="0">
+              <a:solidFill>
+                <a:schemeClr val="tx1"/>
+              </a:solidFill>
+            </a:endParaRPr>
+          </a:p>
+        </p:txBody>
+      </p:sp>
+      <p:sp>
+        <p:nvSpPr>
+          <p:cNvPr id="19" name="Rounded Rectangle 18"/>
           <p:cNvSpPr/>
           <p:nvPr/>
         </p:nvSpPr>
         <p:spPr>
           <a:xfrm>
-            <a:off x="3657600" y="2895600"/>
-            <a:ext cx="1143000" cy="609600"/>
-          </a:xfrm>
-          <a:prstGeom prst="homePlate">
+            <a:off x="228600" y="2667000"/>
+            <a:ext cx="1066800" cy="1066800"/>
+          </a:xfrm>
+          <a:prstGeom prst="roundRect">
             <a:avLst/>
           </a:prstGeom>
         </p:spPr>
@@ -3461,7 +3463,7 @@
             <a:pPr algn="ctr"/>
             <a:r>
               <a:rPr lang="en-GB" dirty="0" smtClean="0"/>
-              <a:t>Session (game)</a:t>
+              <a:t>Client Browser</a:t>
             </a:r>
             <a:endParaRPr lang="en-GB" dirty="0"/>
           </a:p>
@@ -3469,23 +3471,22 @@
       </p:sp>
       <p:cxnSp>
         <p:nvCxnSpPr>
-          <p:cNvPr id="17" name="Straight Arrow Connector 16"/>
+          <p:cNvPr id="21" name="Straight Arrow Connector 20"/>
           <p:cNvCxnSpPr>
-            <a:stCxn id="6" idx="0"/>
-            <a:endCxn id="15" idx="2"/>
+            <a:stCxn id="14" idx="1"/>
+            <a:endCxn id="19" idx="3"/>
           </p:cNvCxnSpPr>
           <p:nvPr/>
         </p:nvCxnSpPr>
         <p:spPr>
-          <a:xfrm rot="16200000" flipV="1">
-            <a:off x="3790950" y="3790950"/>
-            <a:ext cx="609600" cy="38100"/>
+          <a:xfrm rot="10800000" flipV="1">
+            <a:off x="1295400" y="2476500"/>
+            <a:ext cx="1066800" cy="723900"/>
           </a:xfrm>
           <a:prstGeom prst="straightConnector1">
             <a:avLst/>
           </a:prstGeom>
           <a:ln>
-            <a:headEnd type="arrow"/>
             <a:tailEnd type="arrow"/>
           </a:ln>
         </p:spPr>
@@ -3506,17 +3507,17 @@
       </p:cxnSp>
       <p:cxnSp>
         <p:nvCxnSpPr>
-          <p:cNvPr id="19" name="Straight Arrow Connector 18"/>
+          <p:cNvPr id="24" name="Straight Arrow Connector 23"/>
           <p:cNvCxnSpPr>
-            <a:stCxn id="15" idx="3"/>
-            <a:endCxn id="9" idx="1"/>
+            <a:stCxn id="6" idx="1"/>
+            <a:endCxn id="19" idx="3"/>
           </p:cNvCxnSpPr>
           <p:nvPr/>
         </p:nvCxnSpPr>
         <p:spPr>
-          <a:xfrm>
-            <a:off x="4800600" y="3200400"/>
-            <a:ext cx="304800" cy="1588"/>
+          <a:xfrm rot="10800000" flipV="1">
+            <a:off x="1295400" y="3048000"/>
+            <a:ext cx="2819400" cy="152400"/>
           </a:xfrm>
           <a:prstGeom prst="straightConnector1">
             <a:avLst/>
@@ -3542,16 +3543,16 @@
       </p:cxnSp>
       <p:sp>
         <p:nvSpPr>
-          <p:cNvPr id="20" name="Flowchart: Document 19"/>
+          <p:cNvPr id="26" name="Rounded Rectangle 25"/>
           <p:cNvSpPr/>
           <p:nvPr/>
         </p:nvSpPr>
         <p:spPr>
           <a:xfrm>
-            <a:off x="1600200" y="3505200"/>
-            <a:ext cx="1066800" cy="685800"/>
-          </a:xfrm>
-          <a:prstGeom prst="flowChartDocument">
+            <a:off x="228600" y="4038600"/>
+            <a:ext cx="1066800" cy="990600"/>
+          </a:xfrm>
+          <a:prstGeom prst="roundRect">
             <a:avLst/>
           </a:prstGeom>
         </p:spPr>
@@ -3578,7 +3579,7 @@
             <a:pPr algn="ctr"/>
             <a:r>
               <a:rPr lang="en-GB" dirty="0" smtClean="0"/>
-              <a:t>Authored state</a:t>
+              <a:t>Generic Client</a:t>
             </a:r>
             <a:endParaRPr lang="en-GB" dirty="0"/>
           </a:p>
@@ -3586,20 +3587,22 @@
       </p:sp>
       <p:cxnSp>
         <p:nvCxnSpPr>
-          <p:cNvPr id="22" name="Straight Arrow Connector 21"/>
+          <p:cNvPr id="28" name="Curved Connector 27"/>
           <p:cNvCxnSpPr>
-            <a:stCxn id="20" idx="3"/>
-            <a:endCxn id="15" idx="1"/>
+            <a:stCxn id="19" idx="3"/>
+            <a:endCxn id="26" idx="3"/>
           </p:cNvCxnSpPr>
           <p:nvPr/>
         </p:nvCxnSpPr>
         <p:spPr>
-          <a:xfrm flipV="1">
-            <a:off x="2667000" y="3200400"/>
-            <a:ext cx="990600" cy="647700"/>
-          </a:xfrm>
-          <a:prstGeom prst="straightConnector1">
-            <a:avLst/>
+          <a:xfrm>
+            <a:off x="1295400" y="3200400"/>
+            <a:ext cx="1588" cy="1333500"/>
+          </a:xfrm>
+          <a:prstGeom prst="curvedConnector3">
+            <a:avLst>
+              <a:gd name="adj1" fmla="val 14395466"/>
+            </a:avLst>
           </a:prstGeom>
           <a:ln>
             <a:tailEnd type="arrow"/>
@@ -3622,18 +3625,25 @@
       </p:cxnSp>
       <p:sp>
         <p:nvSpPr>
-          <p:cNvPr id="24" name="Flowchart: Multidocument 23"/>
+          <p:cNvPr id="32" name="Rectangular Callout 31"/>
           <p:cNvSpPr/>
           <p:nvPr/>
         </p:nvSpPr>
         <p:spPr>
           <a:xfrm>
-            <a:off x="1447800" y="1600200"/>
-            <a:ext cx="1371600" cy="1143000"/>
-          </a:xfrm>
-          <a:prstGeom prst="flowChartMultidocument">
-            <a:avLst/>
-          </a:prstGeom>
+            <a:off x="1905000" y="3276600"/>
+            <a:ext cx="1828800" cy="838200"/>
+          </a:xfrm>
+          <a:prstGeom prst="wedgeRectCallout">
+            <a:avLst>
+              <a:gd name="adj1" fmla="val -67327"/>
+              <a:gd name="adj2" fmla="val 25869"/>
+            </a:avLst>
+          </a:prstGeom>
+          <a:noFill/>
+          <a:ln>
+            <a:prstDash val="sysDash"/>
+          </a:ln>
         </p:spPr>
         <p:style>
           <a:lnRef idx="2">
@@ -3657,31 +3667,40 @@
           <a:p>
             <a:pPr algn="ctr"/>
             <a:r>
-              <a:rPr lang="en-GB" dirty="0" smtClean="0"/>
-              <a:t>Client state / events</a:t>
-            </a:r>
-            <a:endParaRPr lang="en-GB" dirty="0"/>
+              <a:rPr lang="en-GB" dirty="0" smtClean="0">
+                <a:solidFill>
+                  <a:schemeClr val="tx1"/>
+                </a:solidFill>
+              </a:rPr>
+              <a:t>2:Custom mime type launches app.</a:t>
+            </a:r>
+            <a:endParaRPr lang="en-GB" dirty="0">
+              <a:solidFill>
+                <a:schemeClr val="tx1"/>
+              </a:solidFill>
+            </a:endParaRPr>
           </a:p>
         </p:txBody>
       </p:sp>
       <p:cxnSp>
         <p:nvCxnSpPr>
-          <p:cNvPr id="26" name="Straight Arrow Connector 25"/>
+          <p:cNvPr id="34" name="Straight Arrow Connector 33"/>
           <p:cNvCxnSpPr>
-            <a:stCxn id="24" idx="3"/>
-            <a:endCxn id="15" idx="1"/>
+            <a:stCxn id="26" idx="3"/>
+            <a:endCxn id="5" idx="1"/>
           </p:cNvCxnSpPr>
           <p:nvPr/>
         </p:nvCxnSpPr>
         <p:spPr>
-          <a:xfrm>
-            <a:off x="2819400" y="2171700"/>
-            <a:ext cx="838200" cy="1028700"/>
+          <a:xfrm flipV="1">
+            <a:off x="1295400" y="4038600"/>
+            <a:ext cx="3352800" cy="495300"/>
           </a:xfrm>
           <a:prstGeom prst="straightConnector1">
             <a:avLst/>
           </a:prstGeom>
           <a:ln>
+            <a:headEnd type="arrow"/>
             <a:tailEnd type="arrow"/>
           </a:ln>
         </p:spPr>
@@ -3702,18 +3721,25 @@
       </p:cxnSp>
       <p:sp>
         <p:nvSpPr>
-          <p:cNvPr id="27" name="Flowchart: Multidocument 26"/>
+          <p:cNvPr id="35" name="Rectangular Callout 34"/>
           <p:cNvSpPr/>
           <p:nvPr/>
         </p:nvSpPr>
         <p:spPr>
           <a:xfrm>
-            <a:off x="3429000" y="1219200"/>
-            <a:ext cx="1371600" cy="1143000"/>
-          </a:xfrm>
-          <a:prstGeom prst="flowChartMultidocument">
-            <a:avLst/>
-          </a:prstGeom>
+            <a:off x="533400" y="1219200"/>
+            <a:ext cx="1066800" cy="838200"/>
+          </a:xfrm>
+          <a:prstGeom prst="wedgeRectCallout">
+            <a:avLst>
+              <a:gd name="adj1" fmla="val -23079"/>
+              <a:gd name="adj2" fmla="val 125543"/>
+            </a:avLst>
+          </a:prstGeom>
+          <a:noFill/>
+          <a:ln>
+            <a:prstDash val="sysDash"/>
+          </a:ln>
         </p:spPr>
         <p:style>
           <a:lnRef idx="2">
@@ -3737,8 +3763,203 @@
           <a:p>
             <a:pPr algn="ctr"/>
             <a:r>
+              <a:rPr lang="en-GB" dirty="0" smtClean="0">
+                <a:solidFill>
+                  <a:schemeClr val="tx1"/>
+                </a:solidFill>
+              </a:rPr>
+              <a:t>1:Browse &amp; select “game”</a:t>
+            </a:r>
+            <a:endParaRPr lang="en-GB" dirty="0">
+              <a:solidFill>
+                <a:schemeClr val="tx1"/>
+              </a:solidFill>
+            </a:endParaRPr>
+          </a:p>
+        </p:txBody>
+      </p:sp>
+      <p:sp>
+        <p:nvSpPr>
+          <p:cNvPr id="36" name="Rectangular Callout 35"/>
+          <p:cNvSpPr/>
+          <p:nvPr/>
+        </p:nvSpPr>
+        <p:spPr>
+          <a:xfrm>
+            <a:off x="2133600" y="4648200"/>
+            <a:ext cx="1905000" cy="609600"/>
+          </a:xfrm>
+          <a:prstGeom prst="wedgeRectCallout">
+            <a:avLst>
+              <a:gd name="adj1" fmla="val -26985"/>
+              <a:gd name="adj2" fmla="val -95079"/>
+            </a:avLst>
+          </a:prstGeom>
+          <a:noFill/>
+          <a:ln>
+            <a:prstDash val="sysDash"/>
+          </a:ln>
+        </p:spPr>
+        <p:style>
+          <a:lnRef idx="2">
+            <a:schemeClr val="accent1">
+              <a:shade val="50000"/>
+            </a:schemeClr>
+          </a:lnRef>
+          <a:fillRef idx="1">
+            <a:schemeClr val="accent1"/>
+          </a:fillRef>
+          <a:effectRef idx="0">
+            <a:schemeClr val="accent1"/>
+          </a:effectRef>
+          <a:fontRef idx="minor">
+            <a:schemeClr val="lt1"/>
+          </a:fontRef>
+        </p:style>
+        <p:txBody>
+          <a:bodyPr rtlCol="0" anchor="ctr"/>
+          <a:lstStyle/>
+          <a:p>
+            <a:pPr algn="ctr"/>
+            <a:r>
+              <a:rPr lang="en-GB" dirty="0" smtClean="0">
+                <a:solidFill>
+                  <a:schemeClr val="tx1"/>
+                </a:solidFill>
+              </a:rPr>
+              <a:t>3a: Authenticate / ticket</a:t>
+            </a:r>
+            <a:endParaRPr lang="en-GB" dirty="0">
+              <a:solidFill>
+                <a:schemeClr val="tx1"/>
+              </a:solidFill>
+            </a:endParaRPr>
+          </a:p>
+        </p:txBody>
+      </p:sp>
+      <p:sp>
+        <p:nvSpPr>
+          <p:cNvPr id="40" name="Pentagon 39"/>
+          <p:cNvSpPr/>
+          <p:nvPr/>
+        </p:nvSpPr>
+        <p:spPr>
+          <a:xfrm>
+            <a:off x="6629400" y="4572000"/>
+            <a:ext cx="533400" cy="304800"/>
+          </a:xfrm>
+          <a:prstGeom prst="homePlate">
+            <a:avLst/>
+          </a:prstGeom>
+        </p:spPr>
+        <p:style>
+          <a:lnRef idx="2">
+            <a:schemeClr val="accent1">
+              <a:shade val="50000"/>
+            </a:schemeClr>
+          </a:lnRef>
+          <a:fillRef idx="1">
+            <a:schemeClr val="accent1"/>
+          </a:fillRef>
+          <a:effectRef idx="0">
+            <a:schemeClr val="accent1"/>
+          </a:effectRef>
+          <a:fontRef idx="minor">
+            <a:schemeClr val="lt1"/>
+          </a:fontRef>
+        </p:style>
+        <p:txBody>
+          <a:bodyPr rtlCol="0" anchor="ctr"/>
+          <a:lstStyle/>
+          <a:p>
+            <a:pPr algn="ctr"/>
+            <a:r>
               <a:rPr lang="en-GB" dirty="0" smtClean="0"/>
-              <a:t>Engine events</a:t>
+              <a:t>…</a:t>
+            </a:r>
+            <a:endParaRPr lang="en-GB" dirty="0"/>
+          </a:p>
+        </p:txBody>
+      </p:sp>
+      <p:sp>
+        <p:nvSpPr>
+          <p:cNvPr id="41" name="Pentagon 40"/>
+          <p:cNvSpPr/>
+          <p:nvPr/>
+        </p:nvSpPr>
+        <p:spPr>
+          <a:xfrm>
+            <a:off x="6629400" y="4953000"/>
+            <a:ext cx="533400" cy="304800"/>
+          </a:xfrm>
+          <a:prstGeom prst="homePlate">
+            <a:avLst/>
+          </a:prstGeom>
+        </p:spPr>
+        <p:style>
+          <a:lnRef idx="2">
+            <a:schemeClr val="accent1">
+              <a:shade val="50000"/>
+            </a:schemeClr>
+          </a:lnRef>
+          <a:fillRef idx="1">
+            <a:schemeClr val="accent1"/>
+          </a:fillRef>
+          <a:effectRef idx="0">
+            <a:schemeClr val="accent1"/>
+          </a:effectRef>
+          <a:fontRef idx="minor">
+            <a:schemeClr val="lt1"/>
+          </a:fontRef>
+        </p:style>
+        <p:txBody>
+          <a:bodyPr rtlCol="0" anchor="ctr"/>
+          <a:lstStyle/>
+          <a:p>
+            <a:pPr algn="ctr"/>
+            <a:endParaRPr lang="en-GB" dirty="0"/>
+          </a:p>
+        </p:txBody>
+      </p:sp>
+      <p:sp>
+        <p:nvSpPr>
+          <p:cNvPr id="43" name="Rounded Rectangle 42"/>
+          <p:cNvSpPr/>
+          <p:nvPr/>
+        </p:nvSpPr>
+        <p:spPr>
+          <a:xfrm>
+            <a:off x="4953000" y="1447800"/>
+            <a:ext cx="1143000" cy="609600"/>
+          </a:xfrm>
+          <a:prstGeom prst="roundRect">
+            <a:avLst/>
+          </a:prstGeom>
+        </p:spPr>
+        <p:style>
+          <a:lnRef idx="2">
+            <a:schemeClr val="accent1">
+              <a:shade val="50000"/>
+            </a:schemeClr>
+          </a:lnRef>
+          <a:fillRef idx="1">
+            <a:schemeClr val="accent1"/>
+          </a:fillRef>
+          <a:effectRef idx="0">
+            <a:schemeClr val="accent1"/>
+          </a:effectRef>
+          <a:fontRef idx="minor">
+            <a:schemeClr val="lt1"/>
+          </a:fontRef>
+        </p:style>
+        <p:txBody>
+          <a:bodyPr rtlCol="0" anchor="ctr"/>
+          <a:lstStyle/>
+          <a:p>
+            <a:pPr algn="ctr"/>
+            <a:r>
+              <a:rPr lang="en-GB" dirty="0" smtClean="0"/>
+              <a:t>Admin client</a:t>
             </a:r>
             <a:endParaRPr lang="en-GB" dirty="0"/>
           </a:p>
@@ -3746,22 +3967,380 @@
       </p:sp>
       <p:cxnSp>
         <p:nvCxnSpPr>
-          <p:cNvPr id="29" name="Straight Arrow Connector 28"/>
+          <p:cNvPr id="45" name="Straight Arrow Connector 44"/>
           <p:cNvCxnSpPr>
-            <a:stCxn id="15" idx="0"/>
-            <a:endCxn id="27" idx="2"/>
+            <a:stCxn id="43" idx="2"/>
+            <a:endCxn id="5" idx="0"/>
           </p:cNvCxnSpPr>
           <p:nvPr/>
         </p:nvCxnSpPr>
         <p:spPr>
-          <a:xfrm rot="16200000" flipV="1">
-            <a:off x="3759719" y="2578618"/>
-            <a:ext cx="576686" cy="57277"/>
+          <a:xfrm rot="5400000">
+            <a:off x="4667250" y="2647950"/>
+            <a:ext cx="1447800" cy="266700"/>
           </a:xfrm>
           <a:prstGeom prst="straightConnector1">
             <a:avLst/>
           </a:prstGeom>
           <a:ln>
+            <a:headEnd type="arrow"/>
+            <a:tailEnd type="arrow"/>
+          </a:ln>
+        </p:spPr>
+        <p:style>
+          <a:lnRef idx="1">
+            <a:schemeClr val="accent1"/>
+          </a:lnRef>
+          <a:fillRef idx="0">
+            <a:schemeClr val="accent1"/>
+          </a:fillRef>
+          <a:effectRef idx="0">
+            <a:schemeClr val="accent1"/>
+          </a:effectRef>
+          <a:fontRef idx="minor">
+            <a:schemeClr val="tx1"/>
+          </a:fontRef>
+        </p:style>
+      </p:cxnSp>
+      <p:sp>
+        <p:nvSpPr>
+          <p:cNvPr id="47" name="Rectangular Callout 46"/>
+          <p:cNvSpPr/>
+          <p:nvPr/>
+        </p:nvSpPr>
+        <p:spPr>
+          <a:xfrm>
+            <a:off x="6553200" y="1295400"/>
+            <a:ext cx="1447800" cy="609600"/>
+          </a:xfrm>
+          <a:prstGeom prst="wedgeRectCallout">
+            <a:avLst>
+              <a:gd name="adj1" fmla="val -80402"/>
+              <a:gd name="adj2" fmla="val 6921"/>
+            </a:avLst>
+          </a:prstGeom>
+          <a:noFill/>
+          <a:ln>
+            <a:prstDash val="sysDash"/>
+          </a:ln>
+        </p:spPr>
+        <p:style>
+          <a:lnRef idx="2">
+            <a:schemeClr val="accent1">
+              <a:shade val="50000"/>
+            </a:schemeClr>
+          </a:lnRef>
+          <a:fillRef idx="1">
+            <a:schemeClr val="accent1"/>
+          </a:fillRef>
+          <a:effectRef idx="0">
+            <a:schemeClr val="accent1"/>
+          </a:effectRef>
+          <a:fontRef idx="minor">
+            <a:schemeClr val="lt1"/>
+          </a:fontRef>
+        </p:style>
+        <p:txBody>
+          <a:bodyPr rtlCol="0" anchor="ctr"/>
+          <a:lstStyle/>
+          <a:p>
+            <a:pPr algn="ctr"/>
+            <a:r>
+              <a:rPr lang="en-GB" dirty="0" smtClean="0">
+                <a:solidFill>
+                  <a:schemeClr val="tx1"/>
+                </a:solidFill>
+              </a:rPr>
+              <a:t>0/3: Issues “tickets”</a:t>
+            </a:r>
+            <a:endParaRPr lang="en-GB" dirty="0">
+              <a:solidFill>
+                <a:schemeClr val="tx1"/>
+              </a:solidFill>
+            </a:endParaRPr>
+          </a:p>
+        </p:txBody>
+      </p:sp>
+      <p:sp>
+        <p:nvSpPr>
+          <p:cNvPr id="50" name="Rounded Rectangle 49"/>
+          <p:cNvSpPr/>
+          <p:nvPr/>
+        </p:nvSpPr>
+        <p:spPr>
+          <a:xfrm>
+            <a:off x="228600" y="5181600"/>
+            <a:ext cx="1066800" cy="1143000"/>
+          </a:xfrm>
+          <a:prstGeom prst="roundRect">
+            <a:avLst/>
+          </a:prstGeom>
+        </p:spPr>
+        <p:style>
+          <a:lnRef idx="2">
+            <a:schemeClr val="accent1">
+              <a:shade val="50000"/>
+            </a:schemeClr>
+          </a:lnRef>
+          <a:fillRef idx="1">
+            <a:schemeClr val="accent1"/>
+          </a:fillRef>
+          <a:effectRef idx="0">
+            <a:schemeClr val="accent1"/>
+          </a:effectRef>
+          <a:fontRef idx="minor">
+            <a:schemeClr val="lt1"/>
+          </a:fontRef>
+        </p:style>
+        <p:txBody>
+          <a:bodyPr rtlCol="0" anchor="ctr"/>
+          <a:lstStyle/>
+          <a:p>
+            <a:pPr algn="ctr"/>
+            <a:r>
+              <a:rPr lang="en-GB" dirty="0" smtClean="0"/>
+              <a:t>Game-specific Client</a:t>
+            </a:r>
+            <a:endParaRPr lang="en-GB" dirty="0"/>
+          </a:p>
+        </p:txBody>
+      </p:sp>
+      <p:cxnSp>
+        <p:nvCxnSpPr>
+          <p:cNvPr id="51" name="Straight Arrow Connector 50"/>
+          <p:cNvCxnSpPr>
+            <a:stCxn id="50" idx="3"/>
+          </p:cNvCxnSpPr>
+          <p:nvPr/>
+        </p:nvCxnSpPr>
+        <p:spPr>
+          <a:xfrm flipV="1">
+            <a:off x="1295400" y="5181600"/>
+            <a:ext cx="5334000" cy="571500"/>
+          </a:xfrm>
+          <a:prstGeom prst="straightConnector1">
+            <a:avLst/>
+          </a:prstGeom>
+          <a:ln>
+            <a:headEnd type="arrow"/>
+            <a:tailEnd type="arrow"/>
+          </a:ln>
+        </p:spPr>
+        <p:style>
+          <a:lnRef idx="1">
+            <a:schemeClr val="accent1"/>
+          </a:lnRef>
+          <a:fillRef idx="0">
+            <a:schemeClr val="accent1"/>
+          </a:fillRef>
+          <a:effectRef idx="0">
+            <a:schemeClr val="accent1"/>
+          </a:effectRef>
+          <a:fontRef idx="minor">
+            <a:schemeClr val="tx1"/>
+          </a:fontRef>
+        </p:style>
+      </p:cxnSp>
+      <p:sp>
+        <p:nvSpPr>
+          <p:cNvPr id="54" name="Rectangular Callout 53"/>
+          <p:cNvSpPr/>
+          <p:nvPr/>
+        </p:nvSpPr>
+        <p:spPr>
+          <a:xfrm>
+            <a:off x="1981200" y="5791200"/>
+            <a:ext cx="1905000" cy="609600"/>
+          </a:xfrm>
+          <a:prstGeom prst="wedgeRectCallout">
+            <a:avLst>
+              <a:gd name="adj1" fmla="val -29006"/>
+              <a:gd name="adj2" fmla="val -76132"/>
+            </a:avLst>
+          </a:prstGeom>
+          <a:noFill/>
+          <a:ln>
+            <a:prstDash val="sysDash"/>
+          </a:ln>
+        </p:spPr>
+        <p:style>
+          <a:lnRef idx="2">
+            <a:schemeClr val="accent1">
+              <a:shade val="50000"/>
+            </a:schemeClr>
+          </a:lnRef>
+          <a:fillRef idx="1">
+            <a:schemeClr val="accent1"/>
+          </a:fillRef>
+          <a:effectRef idx="0">
+            <a:schemeClr val="accent1"/>
+          </a:effectRef>
+          <a:fontRef idx="minor">
+            <a:schemeClr val="lt1"/>
+          </a:fontRef>
+        </p:style>
+        <p:txBody>
+          <a:bodyPr rtlCol="0" anchor="ctr"/>
+          <a:lstStyle/>
+          <a:p>
+            <a:pPr algn="ctr"/>
+            <a:r>
+              <a:rPr lang="en-GB" dirty="0" smtClean="0">
+                <a:solidFill>
+                  <a:schemeClr val="tx1"/>
+                </a:solidFill>
+              </a:rPr>
+              <a:t>4: game client-server interaction</a:t>
+            </a:r>
+            <a:endParaRPr lang="en-GB" dirty="0">
+              <a:solidFill>
+                <a:schemeClr val="tx1"/>
+              </a:solidFill>
+            </a:endParaRPr>
+          </a:p>
+        </p:txBody>
+      </p:sp>
+      <p:sp>
+        <p:nvSpPr>
+          <p:cNvPr id="55" name="Rectangular Callout 54"/>
+          <p:cNvSpPr/>
+          <p:nvPr/>
+        </p:nvSpPr>
+        <p:spPr>
+          <a:xfrm>
+            <a:off x="4572000" y="5486400"/>
+            <a:ext cx="1600200" cy="609600"/>
+          </a:xfrm>
+          <a:prstGeom prst="wedgeRectCallout">
+            <a:avLst>
+              <a:gd name="adj1" fmla="val 76369"/>
+              <a:gd name="adj2" fmla="val -86237"/>
+            </a:avLst>
+          </a:prstGeom>
+          <a:noFill/>
+          <a:ln>
+            <a:prstDash val="sysDash"/>
+          </a:ln>
+        </p:spPr>
+        <p:style>
+          <a:lnRef idx="2">
+            <a:schemeClr val="accent1">
+              <a:shade val="50000"/>
+            </a:schemeClr>
+          </a:lnRef>
+          <a:fillRef idx="1">
+            <a:schemeClr val="accent1"/>
+          </a:fillRef>
+          <a:effectRef idx="0">
+            <a:schemeClr val="accent1"/>
+          </a:effectRef>
+          <a:fontRef idx="minor">
+            <a:schemeClr val="lt1"/>
+          </a:fontRef>
+        </p:style>
+        <p:txBody>
+          <a:bodyPr rtlCol="0" anchor="ctr"/>
+          <a:lstStyle/>
+          <a:p>
+            <a:pPr algn="ctr"/>
+            <a:r>
+              <a:rPr lang="en-GB" dirty="0" smtClean="0">
+                <a:solidFill>
+                  <a:schemeClr val="tx1"/>
+                </a:solidFill>
+              </a:rPr>
+              <a:t>Client “conversation”</a:t>
+            </a:r>
+            <a:endParaRPr lang="en-GB" dirty="0">
+              <a:solidFill>
+                <a:schemeClr val="tx1"/>
+              </a:solidFill>
+            </a:endParaRPr>
+          </a:p>
+        </p:txBody>
+      </p:sp>
+      <p:cxnSp>
+        <p:nvCxnSpPr>
+          <p:cNvPr id="89" name="Straight Connector 88"/>
+          <p:cNvCxnSpPr/>
+          <p:nvPr/>
+        </p:nvCxnSpPr>
+        <p:spPr>
+          <a:xfrm rot="5400000">
+            <a:off x="-952500" y="3924300"/>
+            <a:ext cx="5410200" cy="1588"/>
+          </a:xfrm>
+          <a:prstGeom prst="line">
+            <a:avLst/>
+          </a:prstGeom>
+          <a:ln>
+            <a:prstDash val="sysDot"/>
+          </a:ln>
+        </p:spPr>
+        <p:style>
+          <a:lnRef idx="1">
+            <a:schemeClr val="accent1"/>
+          </a:lnRef>
+          <a:fillRef idx="0">
+            <a:schemeClr val="accent1"/>
+          </a:fillRef>
+          <a:effectRef idx="0">
+            <a:schemeClr val="accent1"/>
+          </a:effectRef>
+          <a:fontRef idx="minor">
+            <a:schemeClr val="tx1"/>
+          </a:fontRef>
+        </p:style>
+      </p:cxnSp>
+      <p:sp>
+        <p:nvSpPr>
+          <p:cNvPr id="93" name="Rectangle 92"/>
+          <p:cNvSpPr/>
+          <p:nvPr/>
+        </p:nvSpPr>
+        <p:spPr>
+          <a:xfrm>
+            <a:off x="6705600" y="3581400"/>
+            <a:ext cx="1927001" cy="369332"/>
+          </a:xfrm>
+          <a:prstGeom prst="rect">
+            <a:avLst/>
+          </a:prstGeom>
+        </p:spPr>
+        <p:txBody>
+          <a:bodyPr wrap="none">
+            <a:spAutoFit/>
+          </a:bodyPr>
+          <a:lstStyle/>
+          <a:p>
+            <a:pPr algn="ctr"/>
+            <a:r>
+              <a:rPr lang="en-GB" dirty="0" smtClean="0"/>
+              <a:t>Game server (1..n)</a:t>
+            </a:r>
+            <a:endParaRPr lang="en-GB" dirty="0"/>
+          </a:p>
+        </p:txBody>
+      </p:sp>
+      <p:cxnSp>
+        <p:nvCxnSpPr>
+          <p:cNvPr id="98" name="Straight Arrow Connector 97"/>
+          <p:cNvCxnSpPr>
+            <a:stCxn id="6" idx="1"/>
+            <a:endCxn id="14" idx="3"/>
+          </p:cNvCxnSpPr>
+          <p:nvPr/>
+        </p:nvCxnSpPr>
+        <p:spPr>
+          <a:xfrm rot="10800000">
+            <a:off x="3352800" y="2476500"/>
+            <a:ext cx="762000" cy="571500"/>
+          </a:xfrm>
+          <a:prstGeom prst="straightConnector1">
+            <a:avLst/>
+          </a:prstGeom>
+          <a:ln>
+            <a:prstDash val="dash"/>
             <a:tailEnd type="arrow"/>
           </a:ln>
         </p:spPr>
@@ -3807,7 +4386,95 @@
       </p:grpSpPr>
       <p:sp>
         <p:nvSpPr>
-          <p:cNvPr id="3" name="Title 2"/>
+          <p:cNvPr id="28" name="Oval 27"/>
+          <p:cNvSpPr/>
+          <p:nvPr/>
+        </p:nvSpPr>
+        <p:spPr>
+          <a:xfrm>
+            <a:off x="4724400" y="3528536"/>
+            <a:ext cx="1295400" cy="914400"/>
+          </a:xfrm>
+          <a:prstGeom prst="ellipse">
+            <a:avLst/>
+          </a:prstGeom>
+        </p:spPr>
+        <p:style>
+          <a:lnRef idx="2">
+            <a:schemeClr val="accent1">
+              <a:shade val="50000"/>
+            </a:schemeClr>
+          </a:lnRef>
+          <a:fillRef idx="1">
+            <a:schemeClr val="accent1"/>
+          </a:fillRef>
+          <a:effectRef idx="0">
+            <a:schemeClr val="accent1"/>
+          </a:effectRef>
+          <a:fontRef idx="minor">
+            <a:schemeClr val="lt1"/>
+          </a:fontRef>
+        </p:style>
+        <p:txBody>
+          <a:bodyPr rtlCol="0" anchor="ctr"/>
+          <a:lstStyle/>
+          <a:p>
+            <a:pPr algn="ctr"/>
+            <a:r>
+              <a:rPr lang="en-GB" dirty="0" smtClean="0"/>
+              <a:t>Session (game)</a:t>
+            </a:r>
+            <a:endParaRPr lang="en-GB" dirty="0"/>
+          </a:p>
+        </p:txBody>
+      </p:sp>
+      <p:sp>
+        <p:nvSpPr>
+          <p:cNvPr id="30" name="Oval 29"/>
+          <p:cNvSpPr/>
+          <p:nvPr/>
+        </p:nvSpPr>
+        <p:spPr>
+          <a:xfrm>
+            <a:off x="4648200" y="3604736"/>
+            <a:ext cx="1295400" cy="914400"/>
+          </a:xfrm>
+          <a:prstGeom prst="ellipse">
+            <a:avLst/>
+          </a:prstGeom>
+        </p:spPr>
+        <p:style>
+          <a:lnRef idx="2">
+            <a:schemeClr val="accent1">
+              <a:shade val="50000"/>
+            </a:schemeClr>
+          </a:lnRef>
+          <a:fillRef idx="1">
+            <a:schemeClr val="accent1"/>
+          </a:fillRef>
+          <a:effectRef idx="0">
+            <a:schemeClr val="accent1"/>
+          </a:effectRef>
+          <a:fontRef idx="minor">
+            <a:schemeClr val="lt1"/>
+          </a:fontRef>
+        </p:style>
+        <p:txBody>
+          <a:bodyPr rtlCol="0" anchor="ctr"/>
+          <a:lstStyle/>
+          <a:p>
+            <a:pPr algn="ctr"/>
+            <a:r>
+              <a:rPr lang="en-GB" dirty="0" smtClean="0"/>
+              <a:t>Session (game)</a:t>
+            </a:r>
+            <a:endParaRPr lang="en-GB" dirty="0"/>
+          </a:p>
+        </p:txBody>
+      </p:sp>
+      <p:sp>
+        <p:nvSpPr>
+          <p:cNvPr id="4" name="Title 3"/>
           <p:cNvSpPr>
             <a:spLocks noGrp="1"/>
           </p:cNvSpPr>
@@ -3822,7 +4489,7 @@
           <a:p>
             <a:r>
               <a:rPr lang="en-GB" dirty="0" smtClean="0"/>
-              <a:t>URL hierarchy</a:t>
+              <a:t>Game server internal overview</a:t>
             </a:r>
             <a:endParaRPr lang="en-GB" dirty="0"/>
           </a:p>
@@ -3830,145 +4497,1232 @@
       </p:sp>
       <p:sp>
         <p:nvSpPr>
-          <p:cNvPr id="4" name="Content Placeholder 3"/>
-          <p:cNvSpPr>
-            <a:spLocks noGrp="1"/>
-          </p:cNvSpPr>
-          <p:nvPr>
-            <p:ph idx="1"/>
-          </p:nvPr>
-        </p:nvSpPr>
-        <p:spPr/>
-        <p:txBody>
-          <a:bodyPr>
-            <a:normAutofit/>
+          <p:cNvPr id="5" name="Flowchart: Magnetic Disk 4"/>
+          <p:cNvSpPr/>
+          <p:nvPr/>
+        </p:nvSpPr>
+        <p:spPr>
+          <a:xfrm>
+            <a:off x="8001000" y="1928336"/>
+            <a:ext cx="990600" cy="1066800"/>
+          </a:xfrm>
+          <a:prstGeom prst="flowChartMagneticDisk">
+            <a:avLst/>
+          </a:prstGeom>
+        </p:spPr>
+        <p:style>
+          <a:lnRef idx="2">
+            <a:schemeClr val="accent1">
+              <a:shade val="50000"/>
+            </a:schemeClr>
+          </a:lnRef>
+          <a:fillRef idx="1">
+            <a:schemeClr val="accent1"/>
+          </a:fillRef>
+          <a:effectRef idx="0">
+            <a:schemeClr val="accent1"/>
+          </a:effectRef>
+          <a:fontRef idx="minor">
+            <a:schemeClr val="lt1"/>
+          </a:fontRef>
+        </p:style>
+        <p:txBody>
+          <a:bodyPr rtlCol="0" anchor="ctr"/>
+          <a:lstStyle/>
+          <a:p>
+            <a:pPr algn="ctr"/>
+            <a:r>
+              <a:rPr lang="en-GB" dirty="0" smtClean="0"/>
+              <a:t>Session DB</a:t>
+            </a:r>
+            <a:endParaRPr lang="en-GB" dirty="0"/>
+          </a:p>
+        </p:txBody>
+      </p:sp>
+      <p:sp>
+        <p:nvSpPr>
+          <p:cNvPr id="6" name="Rounded Rectangle 5"/>
+          <p:cNvSpPr/>
+          <p:nvPr/>
+        </p:nvSpPr>
+        <p:spPr>
+          <a:xfrm>
+            <a:off x="6781800" y="2156936"/>
+            <a:ext cx="1066800" cy="609600"/>
+          </a:xfrm>
+          <a:prstGeom prst="roundRect">
+            <a:avLst/>
+          </a:prstGeom>
+        </p:spPr>
+        <p:style>
+          <a:lnRef idx="2">
+            <a:schemeClr val="accent1">
+              <a:shade val="50000"/>
+            </a:schemeClr>
+          </a:lnRef>
+          <a:fillRef idx="1">
+            <a:schemeClr val="accent1"/>
+          </a:fillRef>
+          <a:effectRef idx="0">
+            <a:schemeClr val="accent1"/>
+          </a:effectRef>
+          <a:fontRef idx="minor">
+            <a:schemeClr val="lt1"/>
+          </a:fontRef>
+        </p:style>
+        <p:txBody>
+          <a:bodyPr rtlCol="0" anchor="ctr"/>
+          <a:lstStyle/>
+          <a:p>
+            <a:pPr algn="ctr"/>
+            <a:r>
+              <a:rPr lang="en-GB" dirty="0" smtClean="0"/>
+              <a:t>JPA provider</a:t>
+            </a:r>
+            <a:endParaRPr lang="en-GB" dirty="0"/>
+          </a:p>
+        </p:txBody>
+      </p:sp>
+      <p:cxnSp>
+        <p:nvCxnSpPr>
+          <p:cNvPr id="8" name="Straight Connector 7"/>
+          <p:cNvCxnSpPr>
+            <a:stCxn id="6" idx="3"/>
+            <a:endCxn id="5" idx="2"/>
+          </p:cNvCxnSpPr>
+          <p:nvPr/>
+        </p:nvCxnSpPr>
+        <p:spPr>
+          <a:xfrm>
+            <a:off x="7848600" y="2461736"/>
+            <a:ext cx="152400" cy="1588"/>
+          </a:xfrm>
+          <a:prstGeom prst="line">
+            <a:avLst/>
+          </a:prstGeom>
+        </p:spPr>
+        <p:style>
+          <a:lnRef idx="1">
+            <a:schemeClr val="accent1"/>
+          </a:lnRef>
+          <a:fillRef idx="0">
+            <a:schemeClr val="accent1"/>
+          </a:fillRef>
+          <a:effectRef idx="0">
+            <a:schemeClr val="accent1"/>
+          </a:effectRef>
+          <a:fontRef idx="minor">
+            <a:schemeClr val="tx1"/>
+          </a:fontRef>
+        </p:style>
+      </p:cxnSp>
+      <p:sp>
+        <p:nvSpPr>
+          <p:cNvPr id="9" name="Rectangle 8"/>
+          <p:cNvSpPr/>
+          <p:nvPr/>
+        </p:nvSpPr>
+        <p:spPr>
+          <a:xfrm>
+            <a:off x="6324600" y="3833336"/>
+            <a:ext cx="1524000" cy="914400"/>
+          </a:xfrm>
+          <a:prstGeom prst="rect">
+            <a:avLst/>
+          </a:prstGeom>
+        </p:spPr>
+        <p:style>
+          <a:lnRef idx="2">
+            <a:schemeClr val="accent1">
+              <a:shade val="50000"/>
+            </a:schemeClr>
+          </a:lnRef>
+          <a:fillRef idx="1">
+            <a:schemeClr val="accent1"/>
+          </a:fillRef>
+          <a:effectRef idx="0">
+            <a:schemeClr val="accent1"/>
+          </a:effectRef>
+          <a:fontRef idx="minor">
+            <a:schemeClr val="lt1"/>
+          </a:fontRef>
+        </p:style>
+        <p:txBody>
+          <a:bodyPr rtlCol="0" anchor="ctr"/>
+          <a:lstStyle/>
+          <a:p>
+            <a:pPr algn="ctr"/>
+            <a:r>
+              <a:rPr lang="en-GB" dirty="0" smtClean="0"/>
+              <a:t>Drools fusion rule/event engine</a:t>
+            </a:r>
+            <a:endParaRPr lang="en-GB" dirty="0"/>
+          </a:p>
+        </p:txBody>
+      </p:sp>
+      <p:sp>
+        <p:nvSpPr>
+          <p:cNvPr id="10" name="Pentagon 9"/>
+          <p:cNvSpPr/>
+          <p:nvPr/>
+        </p:nvSpPr>
+        <p:spPr>
+          <a:xfrm>
+            <a:off x="381000" y="2995136"/>
+            <a:ext cx="1600200" cy="762000"/>
+          </a:xfrm>
+          <a:prstGeom prst="homePlate">
+            <a:avLst/>
+          </a:prstGeom>
+          <a:solidFill>
+            <a:schemeClr val="bg1"/>
+          </a:solidFill>
+        </p:spPr>
+        <p:style>
+          <a:lnRef idx="2">
+            <a:schemeClr val="accent1">
+              <a:shade val="50000"/>
+            </a:schemeClr>
+          </a:lnRef>
+          <a:fillRef idx="1">
+            <a:schemeClr val="accent1"/>
+          </a:fillRef>
+          <a:effectRef idx="0">
+            <a:schemeClr val="accent1"/>
+          </a:effectRef>
+          <a:fontRef idx="minor">
+            <a:schemeClr val="lt1"/>
+          </a:fontRef>
+        </p:style>
+        <p:txBody>
+          <a:bodyPr rtlCol="0" anchor="ctr"/>
+          <a:lstStyle/>
+          <a:p>
+            <a:pPr algn="ctr"/>
+            <a:r>
+              <a:rPr lang="en-GB" dirty="0" smtClean="0"/>
+              <a:t>Session (game)</a:t>
+            </a:r>
+            <a:endParaRPr lang="en-GB" dirty="0"/>
+          </a:p>
+        </p:txBody>
+      </p:sp>
+      <p:sp>
+        <p:nvSpPr>
+          <p:cNvPr id="11" name="Flowchart: Document 10"/>
+          <p:cNvSpPr/>
+          <p:nvPr/>
+        </p:nvSpPr>
+        <p:spPr>
+          <a:xfrm>
+            <a:off x="7010400" y="5204936"/>
+            <a:ext cx="990600" cy="685800"/>
+          </a:xfrm>
+          <a:prstGeom prst="flowChartDocument">
+            <a:avLst/>
+          </a:prstGeom>
+        </p:spPr>
+        <p:style>
+          <a:lnRef idx="2">
+            <a:schemeClr val="accent1">
+              <a:shade val="50000"/>
+            </a:schemeClr>
+          </a:lnRef>
+          <a:fillRef idx="1">
+            <a:schemeClr val="accent1"/>
+          </a:fillRef>
+          <a:effectRef idx="0">
+            <a:schemeClr val="accent1"/>
+          </a:effectRef>
+          <a:fontRef idx="minor">
+            <a:schemeClr val="lt1"/>
+          </a:fontRef>
+        </p:style>
+        <p:txBody>
+          <a:bodyPr rtlCol="0" anchor="ctr"/>
+          <a:lstStyle/>
+          <a:p>
+            <a:pPr algn="ctr"/>
+            <a:r>
+              <a:rPr lang="en-GB" dirty="0" smtClean="0"/>
+              <a:t>Rules</a:t>
+            </a:r>
+          </a:p>
+          <a:p>
+            <a:pPr algn="ctr"/>
+            <a:r>
+              <a:rPr lang="en-GB" dirty="0" smtClean="0"/>
+              <a:t>(DRL)</a:t>
+            </a:r>
+            <a:endParaRPr lang="en-GB" dirty="0"/>
+          </a:p>
+        </p:txBody>
+      </p:sp>
+      <p:cxnSp>
+        <p:nvCxnSpPr>
+          <p:cNvPr id="13" name="Straight Arrow Connector 12"/>
+          <p:cNvCxnSpPr>
+            <a:stCxn id="11" idx="0"/>
+            <a:endCxn id="9" idx="2"/>
+          </p:cNvCxnSpPr>
+          <p:nvPr/>
+        </p:nvCxnSpPr>
+        <p:spPr>
+          <a:xfrm rot="16200000" flipV="1">
+            <a:off x="7067550" y="4766786"/>
+            <a:ext cx="457200" cy="419100"/>
+          </a:xfrm>
+          <a:prstGeom prst="straightConnector1">
+            <a:avLst/>
+          </a:prstGeom>
+          <a:ln>
+            <a:tailEnd type="arrow"/>
+          </a:ln>
+        </p:spPr>
+        <p:style>
+          <a:lnRef idx="1">
+            <a:schemeClr val="accent1"/>
+          </a:lnRef>
+          <a:fillRef idx="0">
+            <a:schemeClr val="accent1"/>
+          </a:fillRef>
+          <a:effectRef idx="0">
+            <a:schemeClr val="accent1"/>
+          </a:effectRef>
+          <a:fontRef idx="minor">
+            <a:schemeClr val="tx1"/>
+          </a:fontRef>
+        </p:style>
+      </p:cxnSp>
+      <p:sp>
+        <p:nvSpPr>
+          <p:cNvPr id="14" name="Pentagon 13"/>
+          <p:cNvSpPr/>
+          <p:nvPr/>
+        </p:nvSpPr>
+        <p:spPr>
+          <a:xfrm>
+            <a:off x="457200" y="3071336"/>
+            <a:ext cx="1600200" cy="762000"/>
+          </a:xfrm>
+          <a:prstGeom prst="homePlate">
+            <a:avLst/>
+          </a:prstGeom>
+          <a:solidFill>
+            <a:schemeClr val="bg1"/>
+          </a:solidFill>
+        </p:spPr>
+        <p:style>
+          <a:lnRef idx="2">
+            <a:schemeClr val="accent1">
+              <a:shade val="50000"/>
+            </a:schemeClr>
+          </a:lnRef>
+          <a:fillRef idx="1">
+            <a:schemeClr val="accent1"/>
+          </a:fillRef>
+          <a:effectRef idx="0">
+            <a:schemeClr val="accent1"/>
+          </a:effectRef>
+          <a:fontRef idx="minor">
+            <a:schemeClr val="lt1"/>
+          </a:fontRef>
+        </p:style>
+        <p:txBody>
+          <a:bodyPr rtlCol="0" anchor="ctr"/>
+          <a:lstStyle/>
+          <a:p>
+            <a:pPr algn="ctr"/>
+            <a:r>
+              <a:rPr lang="en-GB" dirty="0" smtClean="0"/>
+              <a:t>Session (game)</a:t>
+            </a:r>
+            <a:endParaRPr lang="en-GB" dirty="0"/>
+          </a:p>
+        </p:txBody>
+      </p:sp>
+      <p:sp>
+        <p:nvSpPr>
+          <p:cNvPr id="15" name="Pentagon 14"/>
+          <p:cNvSpPr/>
+          <p:nvPr/>
+        </p:nvSpPr>
+        <p:spPr>
+          <a:xfrm>
+            <a:off x="533400" y="3147536"/>
+            <a:ext cx="1600200" cy="762000"/>
+          </a:xfrm>
+          <a:prstGeom prst="homePlate">
+            <a:avLst/>
+          </a:prstGeom>
+        </p:spPr>
+        <p:style>
+          <a:lnRef idx="2">
+            <a:schemeClr val="accent1">
+              <a:shade val="50000"/>
+            </a:schemeClr>
+          </a:lnRef>
+          <a:fillRef idx="1">
+            <a:schemeClr val="accent1"/>
+          </a:fillRef>
+          <a:effectRef idx="0">
+            <a:schemeClr val="accent1"/>
+          </a:effectRef>
+          <a:fontRef idx="minor">
+            <a:schemeClr val="lt1"/>
+          </a:fontRef>
+        </p:style>
+        <p:txBody>
+          <a:bodyPr rtlCol="0" anchor="ctr"/>
+          <a:lstStyle/>
+          <a:p>
+            <a:pPr algn="ctr"/>
+            <a:r>
+              <a:rPr lang="en-GB" dirty="0" smtClean="0"/>
+              <a:t>Conversation</a:t>
+            </a:r>
+          </a:p>
+          <a:p>
+            <a:pPr algn="ctr"/>
+            <a:r>
+              <a:rPr lang="en-GB" dirty="0" smtClean="0"/>
+              <a:t>(client)</a:t>
+            </a:r>
+            <a:endParaRPr lang="en-GB" dirty="0"/>
+          </a:p>
+        </p:txBody>
+      </p:sp>
+      <p:cxnSp>
+        <p:nvCxnSpPr>
+          <p:cNvPr id="17" name="Straight Arrow Connector 16"/>
+          <p:cNvCxnSpPr>
+            <a:stCxn id="6" idx="1"/>
+            <a:endCxn id="28" idx="0"/>
+          </p:cNvCxnSpPr>
+          <p:nvPr/>
+        </p:nvCxnSpPr>
+        <p:spPr>
+          <a:xfrm rot="10800000" flipV="1">
+            <a:off x="5372100" y="2461736"/>
+            <a:ext cx="1409700" cy="1066800"/>
+          </a:xfrm>
+          <a:prstGeom prst="straightConnector1">
+            <a:avLst/>
+          </a:prstGeom>
+          <a:ln>
+            <a:headEnd type="arrow"/>
+            <a:tailEnd type="arrow"/>
+          </a:ln>
+        </p:spPr>
+        <p:style>
+          <a:lnRef idx="1">
+            <a:schemeClr val="accent1"/>
+          </a:lnRef>
+          <a:fillRef idx="0">
+            <a:schemeClr val="accent1"/>
+          </a:fillRef>
+          <a:effectRef idx="0">
+            <a:schemeClr val="accent1"/>
+          </a:effectRef>
+          <a:fontRef idx="minor">
+            <a:schemeClr val="tx1"/>
+          </a:fontRef>
+        </p:style>
+      </p:cxnSp>
+      <p:cxnSp>
+        <p:nvCxnSpPr>
+          <p:cNvPr id="19" name="Straight Arrow Connector 18"/>
+          <p:cNvCxnSpPr>
+            <a:stCxn id="31" idx="6"/>
+            <a:endCxn id="9" idx="1"/>
+          </p:cNvCxnSpPr>
+          <p:nvPr/>
+        </p:nvCxnSpPr>
+        <p:spPr>
+          <a:xfrm>
+            <a:off x="5867400" y="4138136"/>
+            <a:ext cx="457200" cy="152400"/>
+          </a:xfrm>
+          <a:prstGeom prst="straightConnector1">
+            <a:avLst/>
+          </a:prstGeom>
+          <a:ln>
+            <a:tailEnd type="arrow"/>
+          </a:ln>
+        </p:spPr>
+        <p:style>
+          <a:lnRef idx="1">
+            <a:schemeClr val="accent1"/>
+          </a:lnRef>
+          <a:fillRef idx="0">
+            <a:schemeClr val="accent1"/>
+          </a:fillRef>
+          <a:effectRef idx="0">
+            <a:schemeClr val="accent1"/>
+          </a:effectRef>
+          <a:fontRef idx="minor">
+            <a:schemeClr val="tx1"/>
+          </a:fontRef>
+        </p:style>
+      </p:cxnSp>
+      <p:sp>
+        <p:nvSpPr>
+          <p:cNvPr id="20" name="Flowchart: Document 19"/>
+          <p:cNvSpPr/>
+          <p:nvPr/>
+        </p:nvSpPr>
+        <p:spPr>
+          <a:xfrm>
+            <a:off x="4572000" y="5204936"/>
+            <a:ext cx="1066800" cy="685800"/>
+          </a:xfrm>
+          <a:prstGeom prst="flowChartDocument">
+            <a:avLst/>
+          </a:prstGeom>
+        </p:spPr>
+        <p:style>
+          <a:lnRef idx="2">
+            <a:schemeClr val="accent1">
+              <a:shade val="50000"/>
+            </a:schemeClr>
+          </a:lnRef>
+          <a:fillRef idx="1">
+            <a:schemeClr val="accent1"/>
+          </a:fillRef>
+          <a:effectRef idx="0">
+            <a:schemeClr val="accent1"/>
+          </a:effectRef>
+          <a:fontRef idx="minor">
+            <a:schemeClr val="lt1"/>
+          </a:fontRef>
+        </p:style>
+        <p:txBody>
+          <a:bodyPr rtlCol="0" anchor="ctr"/>
+          <a:lstStyle/>
+          <a:p>
+            <a:pPr algn="ctr"/>
+            <a:r>
+              <a:rPr lang="en-GB" dirty="0" smtClean="0"/>
+              <a:t>Authored state</a:t>
+            </a:r>
+            <a:endParaRPr lang="en-GB" dirty="0"/>
+          </a:p>
+        </p:txBody>
+      </p:sp>
+      <p:cxnSp>
+        <p:nvCxnSpPr>
+          <p:cNvPr id="22" name="Straight Arrow Connector 21"/>
+          <p:cNvCxnSpPr>
+            <a:stCxn id="20" idx="0"/>
+            <a:endCxn id="31" idx="4"/>
+          </p:cNvCxnSpPr>
+          <p:nvPr/>
+        </p:nvCxnSpPr>
+        <p:spPr>
+          <a:xfrm rot="5400000" flipH="1" flipV="1">
+            <a:off x="4857750" y="4842986"/>
+            <a:ext cx="609600" cy="114300"/>
+          </a:xfrm>
+          <a:prstGeom prst="straightConnector1">
+            <a:avLst/>
+          </a:prstGeom>
+          <a:ln>
+            <a:tailEnd type="arrow"/>
+          </a:ln>
+        </p:spPr>
+        <p:style>
+          <a:lnRef idx="1">
+            <a:schemeClr val="accent1"/>
+          </a:lnRef>
+          <a:fillRef idx="0">
+            <a:schemeClr val="accent1"/>
+          </a:fillRef>
+          <a:effectRef idx="0">
+            <a:schemeClr val="accent1"/>
+          </a:effectRef>
+          <a:fontRef idx="minor">
+            <a:schemeClr val="tx1"/>
+          </a:fontRef>
+        </p:style>
+      </p:cxnSp>
+      <p:sp>
+        <p:nvSpPr>
+          <p:cNvPr id="24" name="Flowchart: Multidocument 23"/>
+          <p:cNvSpPr/>
+          <p:nvPr/>
+        </p:nvSpPr>
+        <p:spPr>
+          <a:xfrm>
+            <a:off x="2819400" y="3452336"/>
+            <a:ext cx="1371600" cy="1143000"/>
+          </a:xfrm>
+          <a:prstGeom prst="flowChartMultidocument">
+            <a:avLst/>
+          </a:prstGeom>
+        </p:spPr>
+        <p:style>
+          <a:lnRef idx="2">
+            <a:schemeClr val="accent1">
+              <a:shade val="50000"/>
+            </a:schemeClr>
+          </a:lnRef>
+          <a:fillRef idx="1">
+            <a:schemeClr val="accent1"/>
+          </a:fillRef>
+          <a:effectRef idx="0">
+            <a:schemeClr val="accent1"/>
+          </a:effectRef>
+          <a:fontRef idx="minor">
+            <a:schemeClr val="lt1"/>
+          </a:fontRef>
+        </p:style>
+        <p:txBody>
+          <a:bodyPr rtlCol="0" anchor="ctr"/>
+          <a:lstStyle/>
+          <a:p>
+            <a:pPr algn="ctr"/>
+            <a:r>
+              <a:rPr lang="en-GB" dirty="0" smtClean="0"/>
+              <a:t>Client state / events</a:t>
+            </a:r>
+            <a:endParaRPr lang="en-GB" dirty="0"/>
+          </a:p>
+        </p:txBody>
+      </p:sp>
+      <p:cxnSp>
+        <p:nvCxnSpPr>
+          <p:cNvPr id="26" name="Straight Arrow Connector 25"/>
+          <p:cNvCxnSpPr>
+            <a:stCxn id="24" idx="3"/>
+            <a:endCxn id="31" idx="2"/>
+          </p:cNvCxnSpPr>
+          <p:nvPr/>
+        </p:nvCxnSpPr>
+        <p:spPr>
+          <a:xfrm>
+            <a:off x="4191000" y="4023836"/>
+            <a:ext cx="381000" cy="114300"/>
+          </a:xfrm>
+          <a:prstGeom prst="straightConnector1">
+            <a:avLst/>
+          </a:prstGeom>
+          <a:ln>
+            <a:tailEnd type="arrow"/>
+          </a:ln>
+        </p:spPr>
+        <p:style>
+          <a:lnRef idx="1">
+            <a:schemeClr val="accent1"/>
+          </a:lnRef>
+          <a:fillRef idx="0">
+            <a:schemeClr val="accent1"/>
+          </a:fillRef>
+          <a:effectRef idx="0">
+            <a:schemeClr val="accent1"/>
+          </a:effectRef>
+          <a:fontRef idx="minor">
+            <a:schemeClr val="tx1"/>
+          </a:fontRef>
+        </p:style>
+      </p:cxnSp>
+      <p:sp>
+        <p:nvSpPr>
+          <p:cNvPr id="27" name="Flowchart: Multidocument 26"/>
+          <p:cNvSpPr/>
+          <p:nvPr/>
+        </p:nvSpPr>
+        <p:spPr>
+          <a:xfrm>
+            <a:off x="2895600" y="2145268"/>
+            <a:ext cx="1371600" cy="1143000"/>
+          </a:xfrm>
+          <a:prstGeom prst="flowChartMultidocument">
+            <a:avLst/>
+          </a:prstGeom>
+        </p:spPr>
+        <p:style>
+          <a:lnRef idx="2">
+            <a:schemeClr val="accent1">
+              <a:shade val="50000"/>
+            </a:schemeClr>
+          </a:lnRef>
+          <a:fillRef idx="1">
+            <a:schemeClr val="accent1"/>
+          </a:fillRef>
+          <a:effectRef idx="0">
+            <a:schemeClr val="accent1"/>
+          </a:effectRef>
+          <a:fontRef idx="minor">
+            <a:schemeClr val="lt1"/>
+          </a:fontRef>
+        </p:style>
+        <p:txBody>
+          <a:bodyPr rtlCol="0" anchor="ctr"/>
+          <a:lstStyle/>
+          <a:p>
+            <a:pPr algn="ctr"/>
+            <a:r>
+              <a:rPr lang="en-GB" dirty="0" smtClean="0"/>
+              <a:t>Engine events</a:t>
+            </a:r>
+            <a:endParaRPr lang="en-GB" dirty="0"/>
+          </a:p>
+        </p:txBody>
+      </p:sp>
+      <p:cxnSp>
+        <p:nvCxnSpPr>
+          <p:cNvPr id="29" name="Straight Arrow Connector 28"/>
+          <p:cNvCxnSpPr>
+            <a:stCxn id="31" idx="0"/>
+            <a:endCxn id="27" idx="3"/>
+          </p:cNvCxnSpPr>
+          <p:nvPr/>
+        </p:nvCxnSpPr>
+        <p:spPr>
+          <a:xfrm rot="16200000" flipV="1">
+            <a:off x="4261366" y="2722602"/>
+            <a:ext cx="964168" cy="952500"/>
+          </a:xfrm>
+          <a:prstGeom prst="straightConnector1">
+            <a:avLst/>
+          </a:prstGeom>
+          <a:ln>
+            <a:tailEnd type="arrow"/>
+          </a:ln>
+        </p:spPr>
+        <p:style>
+          <a:lnRef idx="1">
+            <a:schemeClr val="accent1"/>
+          </a:lnRef>
+          <a:fillRef idx="0">
+            <a:schemeClr val="accent1"/>
+          </a:fillRef>
+          <a:effectRef idx="0">
+            <a:schemeClr val="accent1"/>
+          </a:effectRef>
+          <a:fontRef idx="minor">
+            <a:schemeClr val="tx1"/>
+          </a:fontRef>
+        </p:style>
+      </p:cxnSp>
+      <p:sp>
+        <p:nvSpPr>
+          <p:cNvPr id="31" name="Oval 30"/>
+          <p:cNvSpPr/>
+          <p:nvPr/>
+        </p:nvSpPr>
+        <p:spPr>
+          <a:xfrm>
+            <a:off x="4572000" y="3680936"/>
+            <a:ext cx="1295400" cy="914400"/>
+          </a:xfrm>
+          <a:prstGeom prst="ellipse">
+            <a:avLst/>
+          </a:prstGeom>
+        </p:spPr>
+        <p:style>
+          <a:lnRef idx="2">
+            <a:schemeClr val="accent1">
+              <a:shade val="50000"/>
+            </a:schemeClr>
+          </a:lnRef>
+          <a:fillRef idx="1">
+            <a:schemeClr val="accent1"/>
+          </a:fillRef>
+          <a:effectRef idx="0">
+            <a:schemeClr val="accent1"/>
+          </a:effectRef>
+          <a:fontRef idx="minor">
+            <a:schemeClr val="lt1"/>
+          </a:fontRef>
+        </p:style>
+        <p:txBody>
+          <a:bodyPr rtlCol="0" anchor="ctr"/>
+          <a:lstStyle/>
+          <a:p>
+            <a:pPr algn="ctr"/>
+            <a:r>
+              <a:rPr lang="en-GB" dirty="0" smtClean="0"/>
+              <a:t>Session (game)</a:t>
+            </a:r>
+            <a:endParaRPr lang="en-GB" dirty="0"/>
+          </a:p>
+        </p:txBody>
+      </p:sp>
+      <p:cxnSp>
+        <p:nvCxnSpPr>
+          <p:cNvPr id="46" name="Straight Arrow Connector 45"/>
+          <p:cNvCxnSpPr>
+            <a:stCxn id="15" idx="3"/>
+            <a:endCxn id="24" idx="1"/>
+          </p:cNvCxnSpPr>
+          <p:nvPr/>
+        </p:nvCxnSpPr>
+        <p:spPr>
+          <a:xfrm>
+            <a:off x="2133600" y="3528536"/>
+            <a:ext cx="685800" cy="495300"/>
+          </a:xfrm>
+          <a:prstGeom prst="straightConnector1">
+            <a:avLst/>
+          </a:prstGeom>
+          <a:ln>
+            <a:tailEnd type="arrow"/>
+          </a:ln>
+        </p:spPr>
+        <p:style>
+          <a:lnRef idx="1">
+            <a:schemeClr val="accent1"/>
+          </a:lnRef>
+          <a:fillRef idx="0">
+            <a:schemeClr val="accent1"/>
+          </a:fillRef>
+          <a:effectRef idx="0">
+            <a:schemeClr val="accent1"/>
+          </a:effectRef>
+          <a:fontRef idx="minor">
+            <a:schemeClr val="tx1"/>
+          </a:fontRef>
+        </p:style>
+      </p:cxnSp>
+      <p:cxnSp>
+        <p:nvCxnSpPr>
+          <p:cNvPr id="48" name="Straight Arrow Connector 47"/>
+          <p:cNvCxnSpPr>
+            <a:stCxn id="27" idx="1"/>
+            <a:endCxn id="15" idx="3"/>
+          </p:cNvCxnSpPr>
+          <p:nvPr/>
+        </p:nvCxnSpPr>
+        <p:spPr>
+          <a:xfrm rot="10800000" flipV="1">
+            <a:off x="2133600" y="2716768"/>
+            <a:ext cx="762000" cy="811768"/>
+          </a:xfrm>
+          <a:prstGeom prst="straightConnector1">
+            <a:avLst/>
+          </a:prstGeom>
+          <a:ln>
+            <a:tailEnd type="arrow"/>
+          </a:ln>
+        </p:spPr>
+        <p:style>
+          <a:lnRef idx="1">
+            <a:schemeClr val="accent1"/>
+          </a:lnRef>
+          <a:fillRef idx="0">
+            <a:schemeClr val="accent1"/>
+          </a:fillRef>
+          <a:effectRef idx="0">
+            <a:schemeClr val="accent1"/>
+          </a:effectRef>
+          <a:fontRef idx="minor">
+            <a:schemeClr val="tx1"/>
+          </a:fontRef>
+        </p:style>
+      </p:cxnSp>
+      <p:cxnSp>
+        <p:nvCxnSpPr>
+          <p:cNvPr id="50" name="Straight Arrow Connector 49"/>
+          <p:cNvCxnSpPr>
+            <a:stCxn id="15" idx="1"/>
+          </p:cNvCxnSpPr>
+          <p:nvPr/>
+        </p:nvCxnSpPr>
+        <p:spPr>
+          <a:xfrm rot="10800000">
+            <a:off x="152400" y="3528536"/>
+            <a:ext cx="381000" cy="1588"/>
+          </a:xfrm>
+          <a:prstGeom prst="straightConnector1">
+            <a:avLst/>
+          </a:prstGeom>
+          <a:ln>
+            <a:headEnd type="arrow"/>
+            <a:tailEnd type="arrow"/>
+          </a:ln>
+        </p:spPr>
+        <p:style>
+          <a:lnRef idx="1">
+            <a:schemeClr val="accent1"/>
+          </a:lnRef>
+          <a:fillRef idx="0">
+            <a:schemeClr val="accent1"/>
+          </a:fillRef>
+          <a:effectRef idx="0">
+            <a:schemeClr val="accent1"/>
+          </a:effectRef>
+          <a:fontRef idx="minor">
+            <a:schemeClr val="tx1"/>
+          </a:fontRef>
+        </p:style>
+      </p:cxnSp>
+      <p:cxnSp>
+        <p:nvCxnSpPr>
+          <p:cNvPr id="52" name="Curved Connector 51"/>
+          <p:cNvCxnSpPr>
+            <a:stCxn id="9" idx="0"/>
+            <a:endCxn id="28" idx="7"/>
+          </p:cNvCxnSpPr>
+          <p:nvPr/>
+        </p:nvCxnSpPr>
+        <p:spPr>
+          <a:xfrm rot="16200000" flipV="1">
+            <a:off x="6372903" y="3119638"/>
+            <a:ext cx="170889" cy="1256507"/>
+          </a:xfrm>
+          <a:prstGeom prst="curvedConnector3">
+            <a:avLst>
+              <a:gd name="adj1" fmla="val 312132"/>
+            </a:avLst>
+          </a:prstGeom>
+          <a:ln>
+            <a:tailEnd type="arrow"/>
+          </a:ln>
+        </p:spPr>
+        <p:style>
+          <a:lnRef idx="1">
+            <a:schemeClr val="accent1"/>
+          </a:lnRef>
+          <a:fillRef idx="0">
+            <a:schemeClr val="accent1"/>
+          </a:fillRef>
+          <a:effectRef idx="0">
+            <a:schemeClr val="accent1"/>
+          </a:effectRef>
+          <a:fontRef idx="minor">
+            <a:schemeClr val="tx1"/>
+          </a:fontRef>
+        </p:style>
+      </p:cxnSp>
+      <p:sp>
+        <p:nvSpPr>
+          <p:cNvPr id="58" name="Flowchart: Document 57"/>
+          <p:cNvSpPr/>
+          <p:nvPr/>
+        </p:nvSpPr>
+        <p:spPr>
+          <a:xfrm>
+            <a:off x="5791200" y="5204936"/>
+            <a:ext cx="1066800" cy="685800"/>
+          </a:xfrm>
+          <a:prstGeom prst="flowChartDocument">
+            <a:avLst/>
+          </a:prstGeom>
+        </p:spPr>
+        <p:style>
+          <a:lnRef idx="2">
+            <a:schemeClr val="accent1">
+              <a:shade val="50000"/>
+            </a:schemeClr>
+          </a:lnRef>
+          <a:fillRef idx="1">
+            <a:schemeClr val="accent1"/>
+          </a:fillRef>
+          <a:effectRef idx="0">
+            <a:schemeClr val="accent1"/>
+          </a:effectRef>
+          <a:fontRef idx="minor">
+            <a:schemeClr val="lt1"/>
+          </a:fontRef>
+        </p:style>
+        <p:txBody>
+          <a:bodyPr rtlCol="0" anchor="ctr"/>
+          <a:lstStyle/>
+          <a:p>
+            <a:pPr algn="ctr"/>
+            <a:r>
+              <a:rPr lang="en-GB" dirty="0" smtClean="0"/>
+              <a:t>Types</a:t>
+            </a:r>
+          </a:p>
+          <a:p>
+            <a:pPr algn="ctr"/>
+            <a:r>
+              <a:rPr lang="en-GB" dirty="0" smtClean="0"/>
+              <a:t>(DRL)</a:t>
+            </a:r>
+            <a:endParaRPr lang="en-GB" dirty="0"/>
+          </a:p>
+        </p:txBody>
+      </p:sp>
+      <p:cxnSp>
+        <p:nvCxnSpPr>
+          <p:cNvPr id="61" name="Straight Arrow Connector 60"/>
+          <p:cNvCxnSpPr>
+            <a:stCxn id="58" idx="0"/>
+            <a:endCxn id="9" idx="2"/>
+          </p:cNvCxnSpPr>
+          <p:nvPr/>
+        </p:nvCxnSpPr>
+        <p:spPr>
+          <a:xfrm rot="5400000" flipH="1" flipV="1">
+            <a:off x="6477000" y="4595336"/>
+            <a:ext cx="457200" cy="762000"/>
+          </a:xfrm>
+          <a:prstGeom prst="straightConnector1">
+            <a:avLst/>
+          </a:prstGeom>
+          <a:ln>
+            <a:tailEnd type="arrow"/>
+          </a:ln>
+        </p:spPr>
+        <p:style>
+          <a:lnRef idx="1">
+            <a:schemeClr val="accent1"/>
+          </a:lnRef>
+          <a:fillRef idx="0">
+            <a:schemeClr val="accent1"/>
+          </a:fillRef>
+          <a:effectRef idx="0">
+            <a:schemeClr val="accent1"/>
+          </a:effectRef>
+          <a:fontRef idx="minor">
+            <a:schemeClr val="tx1"/>
+          </a:fontRef>
+        </p:style>
+      </p:cxnSp>
+      <p:sp>
+        <p:nvSpPr>
+          <p:cNvPr id="69" name="Flowchart: Document 68"/>
+          <p:cNvSpPr/>
+          <p:nvPr/>
+        </p:nvSpPr>
+        <p:spPr>
+          <a:xfrm>
+            <a:off x="3124200" y="5052536"/>
+            <a:ext cx="5029200" cy="1219200"/>
+          </a:xfrm>
+          <a:prstGeom prst="flowChartDocument">
+            <a:avLst/>
+          </a:prstGeom>
+          <a:noFill/>
+          <a:ln>
+            <a:solidFill>
+              <a:schemeClr val="accent1"/>
+            </a:solidFill>
+            <a:prstDash val="dash"/>
+          </a:ln>
+        </p:spPr>
+        <p:style>
+          <a:lnRef idx="2">
+            <a:schemeClr val="accent1">
+              <a:shade val="50000"/>
+            </a:schemeClr>
+          </a:lnRef>
+          <a:fillRef idx="1">
+            <a:schemeClr val="accent1"/>
+          </a:fillRef>
+          <a:effectRef idx="0">
+            <a:schemeClr val="accent1"/>
+          </a:effectRef>
+          <a:fontRef idx="minor">
+            <a:schemeClr val="lt1"/>
+          </a:fontRef>
+        </p:style>
+        <p:txBody>
+          <a:bodyPr rtlCol="0" anchor="ctr"/>
+          <a:lstStyle/>
+          <a:p>
+            <a:pPr algn="ctr"/>
+            <a:endParaRPr lang="en-GB"/>
+          </a:p>
+        </p:txBody>
+      </p:sp>
+      <p:sp>
+        <p:nvSpPr>
+          <p:cNvPr id="70" name="TextBox 69"/>
+          <p:cNvSpPr txBox="1"/>
+          <p:nvPr/>
+        </p:nvSpPr>
+        <p:spPr>
+          <a:xfrm>
+            <a:off x="4495800" y="6260068"/>
+            <a:ext cx="2206694" cy="369332"/>
+          </a:xfrm>
+          <a:prstGeom prst="rect">
+            <a:avLst/>
+          </a:prstGeom>
+          <a:noFill/>
+        </p:spPr>
+        <p:txBody>
+          <a:bodyPr wrap="none" rtlCol="0">
+            <a:spAutoFit/>
           </a:bodyPr>
           <a:lstStyle/>
           <a:p>
             <a:r>
               <a:rPr lang="en-GB" dirty="0" smtClean="0"/>
-              <a:t>model/$</a:t>
-            </a:r>
-            <a:r>
-              <a:rPr lang="en-GB" dirty="0" err="1" smtClean="0"/>
-              <a:t>DataModel</a:t>
-            </a:r>
+              <a:t>Project Definition File</a:t>
+            </a:r>
+            <a:endParaRPr lang="en-GB" dirty="0"/>
+          </a:p>
+        </p:txBody>
+      </p:sp>
+      <p:sp>
+        <p:nvSpPr>
+          <p:cNvPr id="71" name="Flowchart: Document 70"/>
+          <p:cNvSpPr/>
+          <p:nvPr/>
+        </p:nvSpPr>
+        <p:spPr>
+          <a:xfrm>
+            <a:off x="3276600" y="5204936"/>
+            <a:ext cx="1143000" cy="685800"/>
+          </a:xfrm>
+          <a:prstGeom prst="flowChartDocument">
+            <a:avLst/>
+          </a:prstGeom>
+        </p:spPr>
+        <p:style>
+          <a:lnRef idx="2">
+            <a:schemeClr val="accent1">
+              <a:shade val="50000"/>
+            </a:schemeClr>
+          </a:lnRef>
+          <a:fillRef idx="1">
+            <a:schemeClr val="accent1"/>
+          </a:fillRef>
+          <a:effectRef idx="0">
+            <a:schemeClr val="accent1"/>
+          </a:effectRef>
+          <a:fontRef idx="minor">
+            <a:schemeClr val="lt1"/>
+          </a:fontRef>
+        </p:style>
+        <p:txBody>
+          <a:bodyPr rtlCol="0" anchor="ctr"/>
+          <a:lstStyle/>
+          <a:p>
+            <a:pPr algn="ctr"/>
             <a:r>
               <a:rPr lang="en-GB" dirty="0" smtClean="0"/>
-              <a:t>/</a:t>
-            </a:r>
-          </a:p>
-          <a:p>
-            <a:pPr lvl="1"/>
+              <a:t>Client definition</a:t>
+            </a:r>
+            <a:endParaRPr lang="en-GB" dirty="0"/>
+          </a:p>
+        </p:txBody>
+      </p:sp>
+      <p:cxnSp>
+        <p:nvCxnSpPr>
+          <p:cNvPr id="75" name="Straight Arrow Connector 74"/>
+          <p:cNvCxnSpPr>
+            <a:stCxn id="71" idx="0"/>
+            <a:endCxn id="15" idx="2"/>
+          </p:cNvCxnSpPr>
+          <p:nvPr/>
+        </p:nvCxnSpPr>
+        <p:spPr>
+          <a:xfrm rot="16200000" flipV="1">
+            <a:off x="1847850" y="3204686"/>
+            <a:ext cx="1295400" cy="2705100"/>
+          </a:xfrm>
+          <a:prstGeom prst="straightConnector1">
+            <a:avLst/>
+          </a:prstGeom>
+          <a:ln>
+            <a:tailEnd type="arrow"/>
+          </a:ln>
+        </p:spPr>
+        <p:style>
+          <a:lnRef idx="1">
+            <a:schemeClr val="accent1"/>
+          </a:lnRef>
+          <a:fillRef idx="0">
+            <a:schemeClr val="accent1"/>
+          </a:fillRef>
+          <a:effectRef idx="0">
+            <a:schemeClr val="accent1"/>
+          </a:effectRef>
+          <a:fontRef idx="minor">
+            <a:schemeClr val="tx1"/>
+          </a:fontRef>
+        </p:style>
+      </p:cxnSp>
+      <p:sp>
+        <p:nvSpPr>
+          <p:cNvPr id="106" name="Rectangle 105"/>
+          <p:cNvSpPr/>
+          <p:nvPr/>
+        </p:nvSpPr>
+        <p:spPr>
+          <a:xfrm>
+            <a:off x="381000" y="1905000"/>
+            <a:ext cx="1219200" cy="685800"/>
+          </a:xfrm>
+          <a:prstGeom prst="rect">
+            <a:avLst/>
+          </a:prstGeom>
+        </p:spPr>
+        <p:style>
+          <a:lnRef idx="2">
+            <a:schemeClr val="accent1">
+              <a:shade val="50000"/>
+            </a:schemeClr>
+          </a:lnRef>
+          <a:fillRef idx="1">
+            <a:schemeClr val="accent1"/>
+          </a:fillRef>
+          <a:effectRef idx="0">
+            <a:schemeClr val="accent1"/>
+          </a:effectRef>
+          <a:fontRef idx="minor">
+            <a:schemeClr val="lt1"/>
+          </a:fontRef>
+        </p:style>
+        <p:txBody>
+          <a:bodyPr rtlCol="0" anchor="ctr"/>
+          <a:lstStyle/>
+          <a:p>
+            <a:pPr algn="ctr"/>
             <a:r>
               <a:rPr lang="en-GB" dirty="0" smtClean="0"/>
-              <a:t>rules/$</a:t>
-            </a:r>
-            <a:r>
-              <a:rPr lang="en-GB" dirty="0" err="1" smtClean="0"/>
-              <a:t>RuleSet</a:t>
-            </a:r>
+              <a:t>Client manager</a:t>
+            </a:r>
+            <a:endParaRPr lang="en-GB" dirty="0"/>
+          </a:p>
+        </p:txBody>
+      </p:sp>
+      <p:sp>
+        <p:nvSpPr>
+          <p:cNvPr id="108" name="Rectangle 107"/>
+          <p:cNvSpPr/>
+          <p:nvPr/>
+        </p:nvSpPr>
+        <p:spPr>
+          <a:xfrm>
+            <a:off x="4724400" y="1981200"/>
+            <a:ext cx="1219200" cy="685800"/>
+          </a:xfrm>
+          <a:prstGeom prst="rect">
+            <a:avLst/>
+          </a:prstGeom>
+        </p:spPr>
+        <p:style>
+          <a:lnRef idx="2">
+            <a:schemeClr val="accent1">
+              <a:shade val="50000"/>
+            </a:schemeClr>
+          </a:lnRef>
+          <a:fillRef idx="1">
+            <a:schemeClr val="accent1"/>
+          </a:fillRef>
+          <a:effectRef idx="0">
+            <a:schemeClr val="accent1"/>
+          </a:effectRef>
+          <a:fontRef idx="minor">
+            <a:schemeClr val="lt1"/>
+          </a:fontRef>
+        </p:style>
+        <p:txBody>
+          <a:bodyPr rtlCol="0" anchor="ctr"/>
+          <a:lstStyle/>
+          <a:p>
+            <a:pPr algn="ctr"/>
             <a:r>
               <a:rPr lang="en-GB" dirty="0" smtClean="0"/>
-              <a:t>/</a:t>
-            </a:r>
-          </a:p>
-          <a:p>
-            <a:pPr lvl="2"/>
-            <a:r>
-              <a:rPr lang="en-GB" dirty="0" smtClean="0"/>
-              <a:t>session/$Session/</a:t>
-            </a:r>
-          </a:p>
-          <a:p>
-            <a:pPr lvl="3"/>
-            <a:r>
-              <a:rPr lang="en-GB" dirty="0" smtClean="0"/>
-              <a:t>class/$</a:t>
-            </a:r>
-            <a:r>
-              <a:rPr lang="en-GB" dirty="0" err="1" smtClean="0"/>
-              <a:t>DataModelClass</a:t>
-            </a:r>
-            <a:r>
-              <a:rPr lang="en-GB" dirty="0" smtClean="0"/>
-              <a:t>/</a:t>
-            </a:r>
-          </a:p>
-          <a:p>
-            <a:pPr lvl="4"/>
-            <a:r>
-              <a:rPr lang="en-GB" dirty="0" smtClean="0"/>
-              <a:t>$</a:t>
-            </a:r>
-            <a:r>
-              <a:rPr lang="en-GB" dirty="0" err="1" smtClean="0"/>
-              <a:t>InstanceID</a:t>
-            </a:r>
-            <a:endParaRPr lang="en-GB" dirty="0" smtClean="0"/>
-          </a:p>
-          <a:p>
-            <a:pPr lvl="4"/>
-            <a:r>
-              <a:rPr lang="en-GB" dirty="0" smtClean="0"/>
-              <a:t>?query</a:t>
-            </a:r>
-          </a:p>
-          <a:p>
-            <a:pPr lvl="1"/>
-            <a:r>
-              <a:rPr lang="en-GB" dirty="0" smtClean="0"/>
-              <a:t>state/$</a:t>
-            </a:r>
-            <a:r>
-              <a:rPr lang="en-GB" dirty="0" err="1" smtClean="0"/>
-              <a:t>GameState</a:t>
-            </a:r>
-            <a:r>
-              <a:rPr lang="en-GB" dirty="0" smtClean="0"/>
-              <a:t>/</a:t>
-            </a:r>
-          </a:p>
-          <a:p>
-            <a:pPr lvl="2"/>
-            <a:r>
-              <a:rPr lang="en-GB" dirty="0" smtClean="0"/>
-              <a:t>class/$</a:t>
-            </a:r>
-            <a:r>
-              <a:rPr lang="en-GB" dirty="0" err="1" smtClean="0"/>
-              <a:t>DataModelClass</a:t>
-            </a:r>
-            <a:r>
-              <a:rPr lang="en-GB" dirty="0" smtClean="0"/>
-              <a:t>/</a:t>
-            </a:r>
-          </a:p>
-          <a:p>
-            <a:pPr lvl="3"/>
-            <a:r>
-              <a:rPr lang="en-GB" dirty="0" smtClean="0"/>
-              <a:t>$</a:t>
-            </a:r>
-            <a:r>
-              <a:rPr lang="en-GB" dirty="0" err="1" smtClean="0"/>
-              <a:t>InstanceID</a:t>
-            </a:r>
-            <a:endParaRPr lang="en-GB" dirty="0" smtClean="0"/>
-          </a:p>
-          <a:p>
-            <a:pPr lvl="3"/>
-            <a:r>
-              <a:rPr lang="en-GB" dirty="0" smtClean="0"/>
-              <a:t>?query</a:t>
-            </a:r>
-          </a:p>
-          <a:p>
-            <a:pPr lvl="3"/>
-            <a:endParaRPr lang="en-GB" dirty="0" smtClean="0"/>
-          </a:p>
-          <a:p>
-            <a:pPr lvl="3"/>
+              <a:t>Session manager</a:t>
+            </a:r>
             <a:endParaRPr lang="en-GB" dirty="0"/>
           </a:p>
         </p:txBody>
@@ -4100,11 +5854,7 @@
           <a:p>
             <a:r>
               <a:rPr lang="en-GB" dirty="0" smtClean="0"/>
-              <a:t>Game state “evolution</a:t>
-            </a:r>
-            <a:r>
-              <a:rPr lang="en-GB" dirty="0" smtClean="0"/>
-              <a:t>” </a:t>
+              <a:t>Game state “evolution” </a:t>
             </a:r>
           </a:p>
           <a:p>
@@ -4113,7 +5863,6 @@
               <a:rPr lang="en-GB" dirty="0" smtClean="0"/>
               <a:t>[rules]</a:t>
             </a:r>
-            <a:endParaRPr lang="en-GB" dirty="0" smtClean="0"/>
           </a:p>
           <a:p>
             <a:r>

</xml_diff>